<commit_message>
Updated slides 23 to 25 order
</commit_message>
<xml_diff>
--- a/groupd_Presentation.pptx
+++ b/groupd_Presentation.pptx
@@ -13,24 +13,24 @@
     <p:sldId id="258" r:id="rId4"/>
     <p:sldId id="259" r:id="rId5"/>
     <p:sldId id="274" r:id="rId6"/>
-    <p:sldId id="291" r:id="rId7"/>
-    <p:sldId id="292" r:id="rId8"/>
-    <p:sldId id="293" r:id="rId9"/>
-    <p:sldId id="294" r:id="rId10"/>
-    <p:sldId id="295" r:id="rId11"/>
-    <p:sldId id="296" r:id="rId12"/>
-    <p:sldId id="297" r:id="rId13"/>
-    <p:sldId id="262" r:id="rId14"/>
-    <p:sldId id="263" r:id="rId15"/>
-    <p:sldId id="264" r:id="rId16"/>
-    <p:sldId id="265" r:id="rId17"/>
-    <p:sldId id="266" r:id="rId18"/>
-    <p:sldId id="267" r:id="rId19"/>
-    <p:sldId id="268" r:id="rId20"/>
-    <p:sldId id="269" r:id="rId21"/>
-    <p:sldId id="271" r:id="rId22"/>
-    <p:sldId id="272" r:id="rId23"/>
-    <p:sldId id="273" r:id="rId24"/>
+    <p:sldId id="271" r:id="rId7"/>
+    <p:sldId id="272" r:id="rId8"/>
+    <p:sldId id="273" r:id="rId9"/>
+    <p:sldId id="291" r:id="rId10"/>
+    <p:sldId id="292" r:id="rId11"/>
+    <p:sldId id="293" r:id="rId12"/>
+    <p:sldId id="294" r:id="rId13"/>
+    <p:sldId id="295" r:id="rId14"/>
+    <p:sldId id="296" r:id="rId15"/>
+    <p:sldId id="297" r:id="rId16"/>
+    <p:sldId id="262" r:id="rId17"/>
+    <p:sldId id="263" r:id="rId18"/>
+    <p:sldId id="264" r:id="rId19"/>
+    <p:sldId id="265" r:id="rId20"/>
+    <p:sldId id="266" r:id="rId21"/>
+    <p:sldId id="267" r:id="rId22"/>
+    <p:sldId id="268" r:id="rId23"/>
+    <p:sldId id="269" r:id="rId24"/>
     <p:sldId id="279" r:id="rId25"/>
     <p:sldId id="280" r:id="rId26"/>
     <p:sldId id="282" r:id="rId27"/>
@@ -300,7 +300,7 @@
 <file path=ppt/revisionInfo.xml><?xml version="1.0" encoding="utf-8"?>
 <p1510:revInfo xmlns:a="http://schemas.openxmlformats.org/drawingml/2006/main" xmlns:r="http://schemas.openxmlformats.org/officeDocument/2006/relationships" xmlns:p1510="http://schemas.microsoft.com/office/powerpoint/2015/10/main">
   <p1510:revLst>
-    <p1510:client id="{37E925C6-5ED9-4F0A-A835-89857CFC1D5B}" v="32" dt="2020-10-29T01:19:08.852"/>
+    <p1510:client id="{37E925C6-5ED9-4F0A-A835-89857CFC1D5B}" v="33" dt="2020-10-29T01:32:19.452"/>
   </p1510:revLst>
 </p1510:revInfo>
 </file>
@@ -310,7 +310,7 @@
   <pc:docChgLst>
     <pc:chgData name="Toral Shah" userId="29a20b9d8836babc" providerId="LiveId" clId="{37E925C6-5ED9-4F0A-A835-89857CFC1D5B}"/>
     <pc:docChg chg="undo custSel addSld delSld modSld sldOrd">
-      <pc:chgData name="Toral Shah" userId="29a20b9d8836babc" providerId="LiveId" clId="{37E925C6-5ED9-4F0A-A835-89857CFC1D5B}" dt="2020-10-29T01:20:34.305" v="3255" actId="2696"/>
+      <pc:chgData name="Toral Shah" userId="29a20b9d8836babc" providerId="LiveId" clId="{37E925C6-5ED9-4F0A-A835-89857CFC1D5B}" dt="2020-10-29T01:32:19.452" v="3256"/>
       <pc:docMkLst>
         <pc:docMk/>
       </pc:docMkLst>
@@ -441,6 +441,27 @@
         <pc:sldMkLst>
           <pc:docMk/>
           <pc:sldMk cId="0" sldId="270"/>
+        </pc:sldMkLst>
+      </pc:sldChg>
+      <pc:sldChg chg="ord">
+        <pc:chgData name="Toral Shah" userId="29a20b9d8836babc" providerId="LiveId" clId="{37E925C6-5ED9-4F0A-A835-89857CFC1D5B}" dt="2020-10-29T01:32:19.452" v="3256"/>
+        <pc:sldMkLst>
+          <pc:docMk/>
+          <pc:sldMk cId="0" sldId="271"/>
+        </pc:sldMkLst>
+      </pc:sldChg>
+      <pc:sldChg chg="ord">
+        <pc:chgData name="Toral Shah" userId="29a20b9d8836babc" providerId="LiveId" clId="{37E925C6-5ED9-4F0A-A835-89857CFC1D5B}" dt="2020-10-29T01:32:19.452" v="3256"/>
+        <pc:sldMkLst>
+          <pc:docMk/>
+          <pc:sldMk cId="0" sldId="272"/>
+        </pc:sldMkLst>
+      </pc:sldChg>
+      <pc:sldChg chg="ord">
+        <pc:chgData name="Toral Shah" userId="29a20b9d8836babc" providerId="LiveId" clId="{37E925C6-5ED9-4F0A-A835-89857CFC1D5B}" dt="2020-10-29T01:32:19.452" v="3256"/>
+        <pc:sldMkLst>
+          <pc:docMk/>
+          <pc:sldMk cId="0" sldId="273"/>
         </pc:sldMkLst>
       </pc:sldChg>
       <pc:sldChg chg="ord">
@@ -1386,7 +1407,7 @@
     </p:spTree>
     <p:extLst>
       <p:ext uri="{BB962C8B-B14F-4D97-AF65-F5344CB8AC3E}">
-        <p14:creationId xmlns:p14="http://schemas.microsoft.com/office/powerpoint/2010/main" val="1192533544"/>
+        <p14:creationId xmlns:p14="http://schemas.microsoft.com/office/powerpoint/2010/main" val="1367222218"/>
       </p:ext>
     </p:extLst>
   </p:cSld>
@@ -1495,6 +1516,333 @@
     </p:spTree>
     <p:extLst>
       <p:ext uri="{BB962C8B-B14F-4D97-AF65-F5344CB8AC3E}">
+        <p14:creationId xmlns:p14="http://schemas.microsoft.com/office/powerpoint/2010/main" val="2514643654"/>
+      </p:ext>
+    </p:extLst>
+  </p:cSld>
+  <p:clrMapOvr>
+    <a:masterClrMapping/>
+  </p:clrMapOvr>
+</p:notes>
+</file>
+
+<file path=ppt/notesSlides/notesSlide12.xml><?xml version="1.0" encoding="utf-8"?>
+<p:notes xmlns:a="http://schemas.openxmlformats.org/drawingml/2006/main" xmlns:r="http://schemas.openxmlformats.org/officeDocument/2006/relationships" xmlns:p="http://schemas.openxmlformats.org/presentationml/2006/main" showMasterSp="0" showMasterPhAnim="0">
+  <p:cSld>
+    <p:spTree>
+      <p:nvGrpSpPr>
+        <p:cNvPr id="1" name="Shape 73"/>
+        <p:cNvGrpSpPr/>
+        <p:nvPr/>
+      </p:nvGrpSpPr>
+      <p:grpSpPr>
+        <a:xfrm>
+          <a:off x="0" y="0"/>
+          <a:ext cx="0" cy="0"/>
+          <a:chOff x="0" y="0"/>
+          <a:chExt cx="0" cy="0"/>
+        </a:xfrm>
+      </p:grpSpPr>
+      <p:sp>
+        <p:nvSpPr>
+          <p:cNvPr id="74" name="Google Shape;74;ga41e867b0f_0_0:notes"/>
+          <p:cNvSpPr>
+            <a:spLocks noGrp="1" noRot="1" noChangeAspect="1"/>
+          </p:cNvSpPr>
+          <p:nvPr>
+            <p:ph type="sldImg" idx="2"/>
+          </p:nvPr>
+        </p:nvSpPr>
+        <p:spPr>
+          <a:xfrm>
+            <a:off x="381000" y="685800"/>
+            <a:ext cx="6096000" cy="3429000"/>
+          </a:xfrm>
+          <a:custGeom>
+            <a:avLst/>
+            <a:gdLst/>
+            <a:ahLst/>
+            <a:cxnLst/>
+            <a:rect l="l" t="t" r="r" b="b"/>
+            <a:pathLst>
+              <a:path w="120000" h="120000" extrusionOk="0">
+                <a:moveTo>
+                  <a:pt x="0" y="0"/>
+                </a:moveTo>
+                <a:lnTo>
+                  <a:pt x="120000" y="0"/>
+                </a:lnTo>
+                <a:lnTo>
+                  <a:pt x="120000" y="120000"/>
+                </a:lnTo>
+                <a:lnTo>
+                  <a:pt x="0" y="120000"/>
+                </a:lnTo>
+                <a:close/>
+              </a:path>
+            </a:pathLst>
+          </a:custGeom>
+        </p:spPr>
+      </p:sp>
+      <p:sp>
+        <p:nvSpPr>
+          <p:cNvPr id="75" name="Google Shape;75;ga41e867b0f_0_0:notes"/>
+          <p:cNvSpPr txBox="1">
+            <a:spLocks noGrp="1"/>
+          </p:cNvSpPr>
+          <p:nvPr>
+            <p:ph type="body" idx="1"/>
+          </p:nvPr>
+        </p:nvSpPr>
+        <p:spPr>
+          <a:xfrm>
+            <a:off x="685800" y="4343400"/>
+            <a:ext cx="5486400" cy="4114800"/>
+          </a:xfrm>
+          <a:prstGeom prst="rect">
+            <a:avLst/>
+          </a:prstGeom>
+        </p:spPr>
+        <p:txBody>
+          <a:bodyPr spcFirstLastPara="1" wrap="square" lIns="91425" tIns="91425" rIns="91425" bIns="91425" anchor="t" anchorCtr="0">
+            <a:noAutofit/>
+          </a:bodyPr>
+          <a:lstStyle/>
+          <a:p>
+            <a:pPr marL="0" lvl="0" indent="0" algn="l" rtl="0">
+              <a:spcBef>
+                <a:spcPts val="0"/>
+              </a:spcBef>
+              <a:spcAft>
+                <a:spcPts val="0"/>
+              </a:spcAft>
+              <a:buNone/>
+            </a:pPr>
+            <a:endParaRPr/>
+          </a:p>
+        </p:txBody>
+      </p:sp>
+    </p:spTree>
+    <p:extLst>
+      <p:ext uri="{BB962C8B-B14F-4D97-AF65-F5344CB8AC3E}">
+        <p14:creationId xmlns:p14="http://schemas.microsoft.com/office/powerpoint/2010/main" val="466849741"/>
+      </p:ext>
+    </p:extLst>
+  </p:cSld>
+  <p:clrMapOvr>
+    <a:masterClrMapping/>
+  </p:clrMapOvr>
+</p:notes>
+</file>
+
+<file path=ppt/notesSlides/notesSlide13.xml><?xml version="1.0" encoding="utf-8"?>
+<p:notes xmlns:a="http://schemas.openxmlformats.org/drawingml/2006/main" xmlns:r="http://schemas.openxmlformats.org/officeDocument/2006/relationships" xmlns:p="http://schemas.openxmlformats.org/presentationml/2006/main" showMasterSp="0" showMasterPhAnim="0">
+  <p:cSld>
+    <p:spTree>
+      <p:nvGrpSpPr>
+        <p:cNvPr id="1" name="Shape 73"/>
+        <p:cNvGrpSpPr/>
+        <p:nvPr/>
+      </p:nvGrpSpPr>
+      <p:grpSpPr>
+        <a:xfrm>
+          <a:off x="0" y="0"/>
+          <a:ext cx="0" cy="0"/>
+          <a:chOff x="0" y="0"/>
+          <a:chExt cx="0" cy="0"/>
+        </a:xfrm>
+      </p:grpSpPr>
+      <p:sp>
+        <p:nvSpPr>
+          <p:cNvPr id="74" name="Google Shape;74;ga41e867b0f_0_0:notes"/>
+          <p:cNvSpPr>
+            <a:spLocks noGrp="1" noRot="1" noChangeAspect="1"/>
+          </p:cNvSpPr>
+          <p:nvPr>
+            <p:ph type="sldImg" idx="2"/>
+          </p:nvPr>
+        </p:nvSpPr>
+        <p:spPr>
+          <a:xfrm>
+            <a:off x="381000" y="685800"/>
+            <a:ext cx="6096000" cy="3429000"/>
+          </a:xfrm>
+          <a:custGeom>
+            <a:avLst/>
+            <a:gdLst/>
+            <a:ahLst/>
+            <a:cxnLst/>
+            <a:rect l="l" t="t" r="r" b="b"/>
+            <a:pathLst>
+              <a:path w="120000" h="120000" extrusionOk="0">
+                <a:moveTo>
+                  <a:pt x="0" y="0"/>
+                </a:moveTo>
+                <a:lnTo>
+                  <a:pt x="120000" y="0"/>
+                </a:lnTo>
+                <a:lnTo>
+                  <a:pt x="120000" y="120000"/>
+                </a:lnTo>
+                <a:lnTo>
+                  <a:pt x="0" y="120000"/>
+                </a:lnTo>
+                <a:close/>
+              </a:path>
+            </a:pathLst>
+          </a:custGeom>
+        </p:spPr>
+      </p:sp>
+      <p:sp>
+        <p:nvSpPr>
+          <p:cNvPr id="75" name="Google Shape;75;ga41e867b0f_0_0:notes"/>
+          <p:cNvSpPr txBox="1">
+            <a:spLocks noGrp="1"/>
+          </p:cNvSpPr>
+          <p:nvPr>
+            <p:ph type="body" idx="1"/>
+          </p:nvPr>
+        </p:nvSpPr>
+        <p:spPr>
+          <a:xfrm>
+            <a:off x="685800" y="4343400"/>
+            <a:ext cx="5486400" cy="4114800"/>
+          </a:xfrm>
+          <a:prstGeom prst="rect">
+            <a:avLst/>
+          </a:prstGeom>
+        </p:spPr>
+        <p:txBody>
+          <a:bodyPr spcFirstLastPara="1" wrap="square" lIns="91425" tIns="91425" rIns="91425" bIns="91425" anchor="t" anchorCtr="0">
+            <a:noAutofit/>
+          </a:bodyPr>
+          <a:lstStyle/>
+          <a:p>
+            <a:pPr marL="0" lvl="0" indent="0" algn="l" rtl="0">
+              <a:spcBef>
+                <a:spcPts val="0"/>
+              </a:spcBef>
+              <a:spcAft>
+                <a:spcPts val="0"/>
+              </a:spcAft>
+              <a:buNone/>
+            </a:pPr>
+            <a:endParaRPr/>
+          </a:p>
+        </p:txBody>
+      </p:sp>
+    </p:spTree>
+    <p:extLst>
+      <p:ext uri="{BB962C8B-B14F-4D97-AF65-F5344CB8AC3E}">
+        <p14:creationId xmlns:p14="http://schemas.microsoft.com/office/powerpoint/2010/main" val="1192533544"/>
+      </p:ext>
+    </p:extLst>
+  </p:cSld>
+  <p:clrMapOvr>
+    <a:masterClrMapping/>
+  </p:clrMapOvr>
+</p:notes>
+</file>
+
+<file path=ppt/notesSlides/notesSlide14.xml><?xml version="1.0" encoding="utf-8"?>
+<p:notes xmlns:a="http://schemas.openxmlformats.org/drawingml/2006/main" xmlns:r="http://schemas.openxmlformats.org/officeDocument/2006/relationships" xmlns:p="http://schemas.openxmlformats.org/presentationml/2006/main" showMasterSp="0" showMasterPhAnim="0">
+  <p:cSld>
+    <p:spTree>
+      <p:nvGrpSpPr>
+        <p:cNvPr id="1" name="Shape 73"/>
+        <p:cNvGrpSpPr/>
+        <p:nvPr/>
+      </p:nvGrpSpPr>
+      <p:grpSpPr>
+        <a:xfrm>
+          <a:off x="0" y="0"/>
+          <a:ext cx="0" cy="0"/>
+          <a:chOff x="0" y="0"/>
+          <a:chExt cx="0" cy="0"/>
+        </a:xfrm>
+      </p:grpSpPr>
+      <p:sp>
+        <p:nvSpPr>
+          <p:cNvPr id="74" name="Google Shape;74;ga41e867b0f_0_0:notes"/>
+          <p:cNvSpPr>
+            <a:spLocks noGrp="1" noRot="1" noChangeAspect="1"/>
+          </p:cNvSpPr>
+          <p:nvPr>
+            <p:ph type="sldImg" idx="2"/>
+          </p:nvPr>
+        </p:nvSpPr>
+        <p:spPr>
+          <a:xfrm>
+            <a:off x="381000" y="685800"/>
+            <a:ext cx="6096000" cy="3429000"/>
+          </a:xfrm>
+          <a:custGeom>
+            <a:avLst/>
+            <a:gdLst/>
+            <a:ahLst/>
+            <a:cxnLst/>
+            <a:rect l="l" t="t" r="r" b="b"/>
+            <a:pathLst>
+              <a:path w="120000" h="120000" extrusionOk="0">
+                <a:moveTo>
+                  <a:pt x="0" y="0"/>
+                </a:moveTo>
+                <a:lnTo>
+                  <a:pt x="120000" y="0"/>
+                </a:lnTo>
+                <a:lnTo>
+                  <a:pt x="120000" y="120000"/>
+                </a:lnTo>
+                <a:lnTo>
+                  <a:pt x="0" y="120000"/>
+                </a:lnTo>
+                <a:close/>
+              </a:path>
+            </a:pathLst>
+          </a:custGeom>
+        </p:spPr>
+      </p:sp>
+      <p:sp>
+        <p:nvSpPr>
+          <p:cNvPr id="75" name="Google Shape;75;ga41e867b0f_0_0:notes"/>
+          <p:cNvSpPr txBox="1">
+            <a:spLocks noGrp="1"/>
+          </p:cNvSpPr>
+          <p:nvPr>
+            <p:ph type="body" idx="1"/>
+          </p:nvPr>
+        </p:nvSpPr>
+        <p:spPr>
+          <a:xfrm>
+            <a:off x="685800" y="4343400"/>
+            <a:ext cx="5486400" cy="4114800"/>
+          </a:xfrm>
+          <a:prstGeom prst="rect">
+            <a:avLst/>
+          </a:prstGeom>
+        </p:spPr>
+        <p:txBody>
+          <a:bodyPr spcFirstLastPara="1" wrap="square" lIns="91425" tIns="91425" rIns="91425" bIns="91425" anchor="t" anchorCtr="0">
+            <a:noAutofit/>
+          </a:bodyPr>
+          <a:lstStyle/>
+          <a:p>
+            <a:pPr marL="0" lvl="0" indent="0" algn="l" rtl="0">
+              <a:spcBef>
+                <a:spcPts val="0"/>
+              </a:spcBef>
+              <a:spcAft>
+                <a:spcPts val="0"/>
+              </a:spcAft>
+              <a:buNone/>
+            </a:pPr>
+            <a:endParaRPr/>
+          </a:p>
+        </p:txBody>
+      </p:sp>
+    </p:spTree>
+    <p:extLst>
+      <p:ext uri="{BB962C8B-B14F-4D97-AF65-F5344CB8AC3E}">
         <p14:creationId xmlns:p14="http://schemas.microsoft.com/office/powerpoint/2010/main" val="762186175"/>
       </p:ext>
     </p:extLst>
@@ -1505,7 +1853,7 @@
 </p:notes>
 </file>
 
-<file path=ppt/notesSlides/notesSlide12.xml><?xml version="1.0" encoding="utf-8"?>
+<file path=ppt/notesSlides/notesSlide15.xml><?xml version="1.0" encoding="utf-8"?>
 <p:notes xmlns:a="http://schemas.openxmlformats.org/drawingml/2006/main" xmlns:r="http://schemas.openxmlformats.org/officeDocument/2006/relationships" xmlns:p="http://schemas.openxmlformats.org/presentationml/2006/main" showMasterSp="0" showMasterPhAnim="0">
   <p:cSld>
     <p:spTree>
@@ -1609,7 +1957,7 @@
 </p:notes>
 </file>
 
-<file path=ppt/notesSlides/notesSlide13.xml><?xml version="1.0" encoding="utf-8"?>
+<file path=ppt/notesSlides/notesSlide16.xml><?xml version="1.0" encoding="utf-8"?>
 <p:notes xmlns:a="http://schemas.openxmlformats.org/drawingml/2006/main" xmlns:r="http://schemas.openxmlformats.org/officeDocument/2006/relationships" xmlns:p="http://schemas.openxmlformats.org/presentationml/2006/main" showMasterSp="0" showMasterPhAnim="0">
   <p:cSld>
     <p:spTree>
@@ -1713,7 +2061,7 @@
 </p:notes>
 </file>
 
-<file path=ppt/notesSlides/notesSlide14.xml><?xml version="1.0" encoding="utf-8"?>
+<file path=ppt/notesSlides/notesSlide17.xml><?xml version="1.0" encoding="utf-8"?>
 <p:notes xmlns:a="http://schemas.openxmlformats.org/drawingml/2006/main" xmlns:r="http://schemas.openxmlformats.org/officeDocument/2006/relationships" xmlns:p="http://schemas.openxmlformats.org/presentationml/2006/main" showMasterSp="0" showMasterPhAnim="0">
   <p:cSld>
     <p:spTree>
@@ -1817,7 +2165,7 @@
 </p:notes>
 </file>
 
-<file path=ppt/notesSlides/notesSlide15.xml><?xml version="1.0" encoding="utf-8"?>
+<file path=ppt/notesSlides/notesSlide18.xml><?xml version="1.0" encoding="utf-8"?>
 <p:notes xmlns:a="http://schemas.openxmlformats.org/drawingml/2006/main" xmlns:r="http://schemas.openxmlformats.org/officeDocument/2006/relationships" xmlns:p="http://schemas.openxmlformats.org/presentationml/2006/main" showMasterSp="0" showMasterPhAnim="0">
   <p:cSld>
     <p:spTree>
@@ -1921,7 +2269,7 @@
 </p:notes>
 </file>
 
-<file path=ppt/notesSlides/notesSlide16.xml><?xml version="1.0" encoding="utf-8"?>
+<file path=ppt/notesSlides/notesSlide19.xml><?xml version="1.0" encoding="utf-8"?>
 <p:notes xmlns:a="http://schemas.openxmlformats.org/drawingml/2006/main" xmlns:r="http://schemas.openxmlformats.org/officeDocument/2006/relationships" xmlns:p="http://schemas.openxmlformats.org/presentationml/2006/main" showMasterSp="0" showMasterPhAnim="0">
   <p:cSld>
     <p:spTree>
@@ -1982,318 +2330,6 @@
       <p:sp>
         <p:nvSpPr>
           <p:cNvPr id="116" name="Google Shape;116;ga60bb4f43a_0_62:notes"/>
-          <p:cNvSpPr txBox="1">
-            <a:spLocks noGrp="1"/>
-          </p:cNvSpPr>
-          <p:nvPr>
-            <p:ph type="body" idx="1"/>
-          </p:nvPr>
-        </p:nvSpPr>
-        <p:spPr>
-          <a:xfrm>
-            <a:off x="685800" y="4343400"/>
-            <a:ext cx="5486400" cy="4114800"/>
-          </a:xfrm>
-          <a:prstGeom prst="rect">
-            <a:avLst/>
-          </a:prstGeom>
-        </p:spPr>
-        <p:txBody>
-          <a:bodyPr spcFirstLastPara="1" wrap="square" lIns="91425" tIns="91425" rIns="91425" bIns="91425" anchor="t" anchorCtr="0">
-            <a:noAutofit/>
-          </a:bodyPr>
-          <a:lstStyle/>
-          <a:p>
-            <a:pPr marL="0" lvl="0" indent="0" algn="l" rtl="0">
-              <a:spcBef>
-                <a:spcPts val="0"/>
-              </a:spcBef>
-              <a:spcAft>
-                <a:spcPts val="0"/>
-              </a:spcAft>
-              <a:buNone/>
-            </a:pPr>
-            <a:endParaRPr/>
-          </a:p>
-        </p:txBody>
-      </p:sp>
-    </p:spTree>
-  </p:cSld>
-  <p:clrMapOvr>
-    <a:masterClrMapping/>
-  </p:clrMapOvr>
-</p:notes>
-</file>
-
-<file path=ppt/notesSlides/notesSlide17.xml><?xml version="1.0" encoding="utf-8"?>
-<p:notes xmlns:a="http://schemas.openxmlformats.org/drawingml/2006/main" xmlns:r="http://schemas.openxmlformats.org/officeDocument/2006/relationships" xmlns:p="http://schemas.openxmlformats.org/presentationml/2006/main" showMasterSp="0" showMasterPhAnim="0">
-  <p:cSld>
-    <p:spTree>
-      <p:nvGrpSpPr>
-        <p:cNvPr id="1" name="Shape 119"/>
-        <p:cNvGrpSpPr/>
-        <p:nvPr/>
-      </p:nvGrpSpPr>
-      <p:grpSpPr>
-        <a:xfrm>
-          <a:off x="0" y="0"/>
-          <a:ext cx="0" cy="0"/>
-          <a:chOff x="0" y="0"/>
-          <a:chExt cx="0" cy="0"/>
-        </a:xfrm>
-      </p:grpSpPr>
-      <p:sp>
-        <p:nvSpPr>
-          <p:cNvPr id="120" name="Google Shape;120;ga60bb4f43a_0_66:notes"/>
-          <p:cNvSpPr>
-            <a:spLocks noGrp="1" noRot="1" noChangeAspect="1"/>
-          </p:cNvSpPr>
-          <p:nvPr>
-            <p:ph type="sldImg" idx="2"/>
-          </p:nvPr>
-        </p:nvSpPr>
-        <p:spPr>
-          <a:xfrm>
-            <a:off x="381300" y="685800"/>
-            <a:ext cx="6096000" cy="3429000"/>
-          </a:xfrm>
-          <a:custGeom>
-            <a:avLst/>
-            <a:gdLst/>
-            <a:ahLst/>
-            <a:cxnLst/>
-            <a:rect l="l" t="t" r="r" b="b"/>
-            <a:pathLst>
-              <a:path w="120000" h="120000" extrusionOk="0">
-                <a:moveTo>
-                  <a:pt x="0" y="0"/>
-                </a:moveTo>
-                <a:lnTo>
-                  <a:pt x="120000" y="0"/>
-                </a:lnTo>
-                <a:lnTo>
-                  <a:pt x="120000" y="120000"/>
-                </a:lnTo>
-                <a:lnTo>
-                  <a:pt x="0" y="120000"/>
-                </a:lnTo>
-                <a:close/>
-              </a:path>
-            </a:pathLst>
-          </a:custGeom>
-        </p:spPr>
-      </p:sp>
-      <p:sp>
-        <p:nvSpPr>
-          <p:cNvPr id="121" name="Google Shape;121;ga60bb4f43a_0_66:notes"/>
-          <p:cNvSpPr txBox="1">
-            <a:spLocks noGrp="1"/>
-          </p:cNvSpPr>
-          <p:nvPr>
-            <p:ph type="body" idx="1"/>
-          </p:nvPr>
-        </p:nvSpPr>
-        <p:spPr>
-          <a:xfrm>
-            <a:off x="685800" y="4343400"/>
-            <a:ext cx="5486400" cy="4114800"/>
-          </a:xfrm>
-          <a:prstGeom prst="rect">
-            <a:avLst/>
-          </a:prstGeom>
-        </p:spPr>
-        <p:txBody>
-          <a:bodyPr spcFirstLastPara="1" wrap="square" lIns="91425" tIns="91425" rIns="91425" bIns="91425" anchor="t" anchorCtr="0">
-            <a:noAutofit/>
-          </a:bodyPr>
-          <a:lstStyle/>
-          <a:p>
-            <a:pPr marL="0" lvl="0" indent="0" algn="l" rtl="0">
-              <a:spcBef>
-                <a:spcPts val="0"/>
-              </a:spcBef>
-              <a:spcAft>
-                <a:spcPts val="0"/>
-              </a:spcAft>
-              <a:buNone/>
-            </a:pPr>
-            <a:endParaRPr/>
-          </a:p>
-        </p:txBody>
-      </p:sp>
-    </p:spTree>
-  </p:cSld>
-  <p:clrMapOvr>
-    <a:masterClrMapping/>
-  </p:clrMapOvr>
-</p:notes>
-</file>
-
-<file path=ppt/notesSlides/notesSlide18.xml><?xml version="1.0" encoding="utf-8"?>
-<p:notes xmlns:a="http://schemas.openxmlformats.org/drawingml/2006/main" xmlns:r="http://schemas.openxmlformats.org/officeDocument/2006/relationships" xmlns:p="http://schemas.openxmlformats.org/presentationml/2006/main" showMasterSp="0" showMasterPhAnim="0">
-  <p:cSld>
-    <p:spTree>
-      <p:nvGrpSpPr>
-        <p:cNvPr id="1" name="Shape 124"/>
-        <p:cNvGrpSpPr/>
-        <p:nvPr/>
-      </p:nvGrpSpPr>
-      <p:grpSpPr>
-        <a:xfrm>
-          <a:off x="0" y="0"/>
-          <a:ext cx="0" cy="0"/>
-          <a:chOff x="0" y="0"/>
-          <a:chExt cx="0" cy="0"/>
-        </a:xfrm>
-      </p:grpSpPr>
-      <p:sp>
-        <p:nvSpPr>
-          <p:cNvPr id="125" name="Google Shape;125;ga60bb4f43a_0_70:notes"/>
-          <p:cNvSpPr>
-            <a:spLocks noGrp="1" noRot="1" noChangeAspect="1"/>
-          </p:cNvSpPr>
-          <p:nvPr>
-            <p:ph type="sldImg" idx="2"/>
-          </p:nvPr>
-        </p:nvSpPr>
-        <p:spPr>
-          <a:xfrm>
-            <a:off x="381300" y="685800"/>
-            <a:ext cx="6096000" cy="3429000"/>
-          </a:xfrm>
-          <a:custGeom>
-            <a:avLst/>
-            <a:gdLst/>
-            <a:ahLst/>
-            <a:cxnLst/>
-            <a:rect l="l" t="t" r="r" b="b"/>
-            <a:pathLst>
-              <a:path w="120000" h="120000" extrusionOk="0">
-                <a:moveTo>
-                  <a:pt x="0" y="0"/>
-                </a:moveTo>
-                <a:lnTo>
-                  <a:pt x="120000" y="0"/>
-                </a:lnTo>
-                <a:lnTo>
-                  <a:pt x="120000" y="120000"/>
-                </a:lnTo>
-                <a:lnTo>
-                  <a:pt x="0" y="120000"/>
-                </a:lnTo>
-                <a:close/>
-              </a:path>
-            </a:pathLst>
-          </a:custGeom>
-        </p:spPr>
-      </p:sp>
-      <p:sp>
-        <p:nvSpPr>
-          <p:cNvPr id="126" name="Google Shape;126;ga60bb4f43a_0_70:notes"/>
-          <p:cNvSpPr txBox="1">
-            <a:spLocks noGrp="1"/>
-          </p:cNvSpPr>
-          <p:nvPr>
-            <p:ph type="body" idx="1"/>
-          </p:nvPr>
-        </p:nvSpPr>
-        <p:spPr>
-          <a:xfrm>
-            <a:off x="685800" y="4343400"/>
-            <a:ext cx="5486400" cy="4114800"/>
-          </a:xfrm>
-          <a:prstGeom prst="rect">
-            <a:avLst/>
-          </a:prstGeom>
-        </p:spPr>
-        <p:txBody>
-          <a:bodyPr spcFirstLastPara="1" wrap="square" lIns="91425" tIns="91425" rIns="91425" bIns="91425" anchor="t" anchorCtr="0">
-            <a:noAutofit/>
-          </a:bodyPr>
-          <a:lstStyle/>
-          <a:p>
-            <a:pPr marL="0" lvl="0" indent="0" algn="l" rtl="0">
-              <a:spcBef>
-                <a:spcPts val="0"/>
-              </a:spcBef>
-              <a:spcAft>
-                <a:spcPts val="0"/>
-              </a:spcAft>
-              <a:buNone/>
-            </a:pPr>
-            <a:endParaRPr/>
-          </a:p>
-        </p:txBody>
-      </p:sp>
-    </p:spTree>
-  </p:cSld>
-  <p:clrMapOvr>
-    <a:masterClrMapping/>
-  </p:clrMapOvr>
-</p:notes>
-</file>
-
-<file path=ppt/notesSlides/notesSlide19.xml><?xml version="1.0" encoding="utf-8"?>
-<p:notes xmlns:a="http://schemas.openxmlformats.org/drawingml/2006/main" xmlns:r="http://schemas.openxmlformats.org/officeDocument/2006/relationships" xmlns:p="http://schemas.openxmlformats.org/presentationml/2006/main" showMasterSp="0" showMasterPhAnim="0">
-  <p:cSld>
-    <p:spTree>
-      <p:nvGrpSpPr>
-        <p:cNvPr id="1" name="Shape 129"/>
-        <p:cNvGrpSpPr/>
-        <p:nvPr/>
-      </p:nvGrpSpPr>
-      <p:grpSpPr>
-        <a:xfrm>
-          <a:off x="0" y="0"/>
-          <a:ext cx="0" cy="0"/>
-          <a:chOff x="0" y="0"/>
-          <a:chExt cx="0" cy="0"/>
-        </a:xfrm>
-      </p:grpSpPr>
-      <p:sp>
-        <p:nvSpPr>
-          <p:cNvPr id="130" name="Google Shape;130;ga60bb4f43a_0_74:notes"/>
-          <p:cNvSpPr>
-            <a:spLocks noGrp="1" noRot="1" noChangeAspect="1"/>
-          </p:cNvSpPr>
-          <p:nvPr>
-            <p:ph type="sldImg" idx="2"/>
-          </p:nvPr>
-        </p:nvSpPr>
-        <p:spPr>
-          <a:xfrm>
-            <a:off x="381300" y="685800"/>
-            <a:ext cx="6096000" cy="3429000"/>
-          </a:xfrm>
-          <a:custGeom>
-            <a:avLst/>
-            <a:gdLst/>
-            <a:ahLst/>
-            <a:cxnLst/>
-            <a:rect l="l" t="t" r="r" b="b"/>
-            <a:pathLst>
-              <a:path w="120000" h="120000" extrusionOk="0">
-                <a:moveTo>
-                  <a:pt x="0" y="0"/>
-                </a:moveTo>
-                <a:lnTo>
-                  <a:pt x="120000" y="0"/>
-                </a:lnTo>
-                <a:lnTo>
-                  <a:pt x="120000" y="120000"/>
-                </a:lnTo>
-                <a:lnTo>
-                  <a:pt x="0" y="120000"/>
-                </a:lnTo>
-                <a:close/>
-              </a:path>
-            </a:pathLst>
-          </a:custGeom>
-        </p:spPr>
-      </p:sp>
-      <p:sp>
-        <p:nvSpPr>
-          <p:cNvPr id="131" name="Google Shape;131;ga60bb4f43a_0_74:notes"/>
           <p:cNvSpPr txBox="1">
             <a:spLocks noGrp="1"/>
           </p:cNvSpPr>
@@ -2446,7 +2482,7 @@
   <p:cSld>
     <p:spTree>
       <p:nvGrpSpPr>
-        <p:cNvPr id="1" name="Shape 139"/>
+        <p:cNvPr id="1" name="Shape 119"/>
         <p:cNvGrpSpPr/>
         <p:nvPr/>
       </p:nvGrpSpPr>
@@ -2460,7 +2496,7 @@
       </p:grpSpPr>
       <p:sp>
         <p:nvSpPr>
-          <p:cNvPr id="140" name="Google Shape;140;ga60bb4f43a_0_34:notes"/>
+          <p:cNvPr id="120" name="Google Shape;120;ga60bb4f43a_0_66:notes"/>
           <p:cNvSpPr>
             <a:spLocks noGrp="1" noRot="1" noChangeAspect="1"/>
           </p:cNvSpPr>
@@ -2501,7 +2537,7 @@
       </p:sp>
       <p:sp>
         <p:nvSpPr>
-          <p:cNvPr id="141" name="Google Shape;141;ga60bb4f43a_0_34:notes"/>
+          <p:cNvPr id="121" name="Google Shape;121;ga60bb4f43a_0_66:notes"/>
           <p:cNvSpPr txBox="1">
             <a:spLocks noGrp="1"/>
           </p:cNvSpPr>
@@ -2550,7 +2586,7 @@
   <p:cSld>
     <p:spTree>
       <p:nvGrpSpPr>
-        <p:cNvPr id="1" name="Shape 145"/>
+        <p:cNvPr id="1" name="Shape 124"/>
         <p:cNvGrpSpPr/>
         <p:nvPr/>
       </p:nvGrpSpPr>
@@ -2564,7 +2600,7 @@
       </p:grpSpPr>
       <p:sp>
         <p:nvSpPr>
-          <p:cNvPr id="146" name="Google Shape;146;ga60bb4f43a_0_38:notes"/>
+          <p:cNvPr id="125" name="Google Shape;125;ga60bb4f43a_0_70:notes"/>
           <p:cNvSpPr>
             <a:spLocks noGrp="1" noRot="1" noChangeAspect="1"/>
           </p:cNvSpPr>
@@ -2605,7 +2641,7 @@
       </p:sp>
       <p:sp>
         <p:nvSpPr>
-          <p:cNvPr id="147" name="Google Shape;147;ga60bb4f43a_0_38:notes"/>
+          <p:cNvPr id="126" name="Google Shape;126;ga60bb4f43a_0_70:notes"/>
           <p:cNvSpPr txBox="1">
             <a:spLocks noGrp="1"/>
           </p:cNvSpPr>
@@ -2654,7 +2690,7 @@
   <p:cSld>
     <p:spTree>
       <p:nvGrpSpPr>
-        <p:cNvPr id="1" name="Shape 151"/>
+        <p:cNvPr id="1" name="Shape 129"/>
         <p:cNvGrpSpPr/>
         <p:nvPr/>
       </p:nvGrpSpPr>
@@ -2668,7 +2704,7 @@
       </p:grpSpPr>
       <p:sp>
         <p:nvSpPr>
-          <p:cNvPr id="152" name="Google Shape;152;ga60bb4f43a_0_30:notes"/>
+          <p:cNvPr id="130" name="Google Shape;130;ga60bb4f43a_0_74:notes"/>
           <p:cNvSpPr>
             <a:spLocks noGrp="1" noRot="1" noChangeAspect="1"/>
           </p:cNvSpPr>
@@ -2709,7 +2745,7 @@
       </p:sp>
       <p:sp>
         <p:nvSpPr>
-          <p:cNvPr id="153" name="Google Shape;153;ga60bb4f43a_0_30:notes"/>
+          <p:cNvPr id="131" name="Google Shape;131;ga60bb4f43a_0_74:notes"/>
           <p:cNvSpPr txBox="1">
             <a:spLocks noGrp="1"/>
           </p:cNvSpPr>
@@ -3694,7 +3730,7 @@
   <p:cSld>
     <p:spTree>
       <p:nvGrpSpPr>
-        <p:cNvPr id="1" name="Shape 73"/>
+        <p:cNvPr id="1" name="Shape 139"/>
         <p:cNvGrpSpPr/>
         <p:nvPr/>
       </p:nvGrpSpPr>
@@ -3708,7 +3744,7 @@
       </p:grpSpPr>
       <p:sp>
         <p:nvSpPr>
-          <p:cNvPr id="74" name="Google Shape;74;ga41e867b0f_0_0:notes"/>
+          <p:cNvPr id="140" name="Google Shape;140;ga60bb4f43a_0_34:notes"/>
           <p:cNvSpPr>
             <a:spLocks noGrp="1" noRot="1" noChangeAspect="1"/>
           </p:cNvSpPr>
@@ -3718,7 +3754,7 @@
         </p:nvSpPr>
         <p:spPr>
           <a:xfrm>
-            <a:off x="381000" y="685800"/>
+            <a:off x="381300" y="685800"/>
             <a:ext cx="6096000" cy="3429000"/>
           </a:xfrm>
           <a:custGeom>
@@ -3749,7 +3785,7 @@
       </p:sp>
       <p:sp>
         <p:nvSpPr>
-          <p:cNvPr id="75" name="Google Shape;75;ga41e867b0f_0_0:notes"/>
+          <p:cNvPr id="141" name="Google Shape;141;ga60bb4f43a_0_34:notes"/>
           <p:cNvSpPr txBox="1">
             <a:spLocks noGrp="1"/>
           </p:cNvSpPr>
@@ -3786,11 +3822,6 @@
         </p:txBody>
       </p:sp>
     </p:spTree>
-    <p:extLst>
-      <p:ext uri="{BB962C8B-B14F-4D97-AF65-F5344CB8AC3E}">
-        <p14:creationId xmlns:p14="http://schemas.microsoft.com/office/powerpoint/2010/main" val="3780306423"/>
-      </p:ext>
-    </p:extLst>
   </p:cSld>
   <p:clrMapOvr>
     <a:masterClrMapping/>
@@ -3803,7 +3834,7 @@
   <p:cSld>
     <p:spTree>
       <p:nvGrpSpPr>
-        <p:cNvPr id="1" name="Shape 66"/>
+        <p:cNvPr id="1" name="Shape 145"/>
         <p:cNvGrpSpPr/>
         <p:nvPr/>
       </p:nvGrpSpPr>
@@ -3817,7 +3848,7 @@
       </p:grpSpPr>
       <p:sp>
         <p:nvSpPr>
-          <p:cNvPr id="67" name="Google Shape;67;gc6f90357f_0_13:notes"/>
+          <p:cNvPr id="146" name="Google Shape;146;ga60bb4f43a_0_38:notes"/>
           <p:cNvSpPr>
             <a:spLocks noGrp="1" noRot="1" noChangeAspect="1"/>
           </p:cNvSpPr>
@@ -3827,7 +3858,7 @@
         </p:nvSpPr>
         <p:spPr>
           <a:xfrm>
-            <a:off x="381000" y="685800"/>
+            <a:off x="381300" y="685800"/>
             <a:ext cx="6096000" cy="3429000"/>
           </a:xfrm>
           <a:custGeom>
@@ -3858,7 +3889,7 @@
       </p:sp>
       <p:sp>
         <p:nvSpPr>
-          <p:cNvPr id="68" name="Google Shape;68;gc6f90357f_0_13:notes"/>
+          <p:cNvPr id="147" name="Google Shape;147;ga60bb4f43a_0_38:notes"/>
           <p:cNvSpPr txBox="1">
             <a:spLocks noGrp="1"/>
           </p:cNvSpPr>
@@ -3895,11 +3926,6 @@
         </p:txBody>
       </p:sp>
     </p:spTree>
-    <p:extLst>
-      <p:ext uri="{BB962C8B-B14F-4D97-AF65-F5344CB8AC3E}">
-        <p14:creationId xmlns:p14="http://schemas.microsoft.com/office/powerpoint/2010/main" val="226208471"/>
-      </p:ext>
-    </p:extLst>
   </p:cSld>
   <p:clrMapOvr>
     <a:masterClrMapping/>
@@ -3912,7 +3938,7 @@
   <p:cSld>
     <p:spTree>
       <p:nvGrpSpPr>
-        <p:cNvPr id="1" name="Shape 73"/>
+        <p:cNvPr id="1" name="Shape 151"/>
         <p:cNvGrpSpPr/>
         <p:nvPr/>
       </p:nvGrpSpPr>
@@ -3926,7 +3952,7 @@
       </p:grpSpPr>
       <p:sp>
         <p:nvSpPr>
-          <p:cNvPr id="74" name="Google Shape;74;ga41e867b0f_0_0:notes"/>
+          <p:cNvPr id="152" name="Google Shape;152;ga60bb4f43a_0_30:notes"/>
           <p:cNvSpPr>
             <a:spLocks noGrp="1" noRot="1" noChangeAspect="1"/>
           </p:cNvSpPr>
@@ -3936,7 +3962,7 @@
         </p:nvSpPr>
         <p:spPr>
           <a:xfrm>
-            <a:off x="381000" y="685800"/>
+            <a:off x="381300" y="685800"/>
             <a:ext cx="6096000" cy="3429000"/>
           </a:xfrm>
           <a:custGeom>
@@ -3967,7 +3993,7 @@
       </p:sp>
       <p:sp>
         <p:nvSpPr>
-          <p:cNvPr id="75" name="Google Shape;75;ga41e867b0f_0_0:notes"/>
+          <p:cNvPr id="153" name="Google Shape;153;ga60bb4f43a_0_30:notes"/>
           <p:cNvSpPr txBox="1">
             <a:spLocks noGrp="1"/>
           </p:cNvSpPr>
@@ -4004,11 +4030,6 @@
         </p:txBody>
       </p:sp>
     </p:spTree>
-    <p:extLst>
-      <p:ext uri="{BB962C8B-B14F-4D97-AF65-F5344CB8AC3E}">
-        <p14:creationId xmlns:p14="http://schemas.microsoft.com/office/powerpoint/2010/main" val="1367222218"/>
-      </p:ext>
-    </p:extLst>
   </p:cSld>
   <p:clrMapOvr>
     <a:masterClrMapping/>
@@ -4115,7 +4136,7 @@
     </p:spTree>
     <p:extLst>
       <p:ext uri="{BB962C8B-B14F-4D97-AF65-F5344CB8AC3E}">
-        <p14:creationId xmlns:p14="http://schemas.microsoft.com/office/powerpoint/2010/main" val="2514643654"/>
+        <p14:creationId xmlns:p14="http://schemas.microsoft.com/office/powerpoint/2010/main" val="3780306423"/>
       </p:ext>
     </p:extLst>
   </p:cSld>
@@ -4130,7 +4151,7 @@
   <p:cSld>
     <p:spTree>
       <p:nvGrpSpPr>
-        <p:cNvPr id="1" name="Shape 73"/>
+        <p:cNvPr id="1" name="Shape 66"/>
         <p:cNvGrpSpPr/>
         <p:nvPr/>
       </p:nvGrpSpPr>
@@ -4144,7 +4165,7 @@
       </p:grpSpPr>
       <p:sp>
         <p:nvSpPr>
-          <p:cNvPr id="74" name="Google Shape;74;ga41e867b0f_0_0:notes"/>
+          <p:cNvPr id="67" name="Google Shape;67;gc6f90357f_0_13:notes"/>
           <p:cNvSpPr>
             <a:spLocks noGrp="1" noRot="1" noChangeAspect="1"/>
           </p:cNvSpPr>
@@ -4185,7 +4206,7 @@
       </p:sp>
       <p:sp>
         <p:nvSpPr>
-          <p:cNvPr id="75" name="Google Shape;75;ga41e867b0f_0_0:notes"/>
+          <p:cNvPr id="68" name="Google Shape;68;gc6f90357f_0_13:notes"/>
           <p:cNvSpPr txBox="1">
             <a:spLocks noGrp="1"/>
           </p:cNvSpPr>
@@ -4224,7 +4245,7 @@
     </p:spTree>
     <p:extLst>
       <p:ext uri="{BB962C8B-B14F-4D97-AF65-F5344CB8AC3E}">
-        <p14:creationId xmlns:p14="http://schemas.microsoft.com/office/powerpoint/2010/main" val="466849741"/>
+        <p14:creationId xmlns:p14="http://schemas.microsoft.com/office/powerpoint/2010/main" val="226208471"/>
       </p:ext>
     </p:extLst>
   </p:cSld>
@@ -9288,7 +9309,7 @@
   <p:cSld>
     <p:spTree>
       <p:nvGrpSpPr>
-        <p:cNvPr id="1" name="Shape 76"/>
+        <p:cNvPr id="1" name="Shape 69"/>
         <p:cNvGrpSpPr/>
         <p:nvPr/>
       </p:nvGrpSpPr>
@@ -9302,7 +9323,7 @@
       </p:grpSpPr>
       <p:sp>
         <p:nvSpPr>
-          <p:cNvPr id="77" name="Google Shape;77;p16"/>
+          <p:cNvPr id="70" name="Google Shape;70;p15"/>
           <p:cNvSpPr txBox="1">
             <a:spLocks noGrp="1"/>
           </p:cNvSpPr>
@@ -9312,8 +9333,8 @@
         </p:nvSpPr>
         <p:spPr>
           <a:xfrm>
-            <a:off x="265500" y="1382350"/>
-            <a:ext cx="4045200" cy="1333200"/>
+            <a:off x="311839" y="1319916"/>
+            <a:ext cx="4045200" cy="1534602"/>
           </a:xfrm>
           <a:prstGeom prst="rect">
             <a:avLst/>
@@ -9325,7 +9346,7 @@
           </a:bodyPr>
           <a:lstStyle/>
           <a:p>
-            <a:pPr marL="0" lvl="0" indent="0" algn="ctr" rtl="0">
+            <a:pPr marL="0" lvl="0" indent="0" rtl="0">
               <a:spcBef>
                 <a:spcPts val="0"/>
               </a:spcBef>
@@ -9335,24 +9356,20 @@
               <a:buNone/>
             </a:pPr>
             <a:r>
-              <a:rPr lang="en" dirty="0"/>
-              <a:t>D</a:t>
+              <a:rPr lang="en-US" sz="5400" dirty="0">
+                <a:latin typeface="+mn-lt"/>
+              </a:rPr>
+              <a:t>ML MODEL</a:t>
             </a:r>
-            <a:r>
-              <a:rPr lang="en-US" dirty="0" err="1"/>
-              <a:t>ata</a:t>
-            </a:r>
-            <a:r>
-              <a:rPr lang="en-US" dirty="0"/>
-              <a:t> Transformation</a:t>
-            </a:r>
-            <a:endParaRPr dirty="0"/>
+            <a:endParaRPr sz="5400" dirty="0">
+              <a:latin typeface="+mn-lt"/>
+            </a:endParaRPr>
           </a:p>
         </p:txBody>
       </p:sp>
       <p:sp>
         <p:nvSpPr>
-          <p:cNvPr id="79" name="Google Shape;79;p16"/>
+          <p:cNvPr id="71" name="Google Shape;71;p15"/>
           <p:cNvSpPr txBox="1">
             <a:spLocks noGrp="1"/>
           </p:cNvSpPr>
@@ -9362,12 +9379,21 @@
         </p:nvSpPr>
         <p:spPr>
           <a:xfrm>
-            <a:off x="5041500" y="445904"/>
+            <a:off x="5233700" y="724200"/>
             <a:ext cx="3837000" cy="3695100"/>
           </a:xfrm>
           <a:prstGeom prst="rect">
             <a:avLst/>
           </a:prstGeom>
+          <a:ln w="9525" cap="flat" cmpd="sng">
+            <a:solidFill>
+              <a:schemeClr val="dk1"/>
+            </a:solidFill>
+            <a:prstDash val="solid"/>
+            <a:round/>
+            <a:headEnd type="none" w="sm" len="sm"/>
+            <a:tailEnd type="none" w="sm" len="sm"/>
+          </a:ln>
         </p:spPr>
         <p:txBody>
           <a:bodyPr spcFirstLastPara="1" wrap="square" lIns="91425" tIns="91425" rIns="91425" bIns="91425" anchor="ctr" anchorCtr="0">
@@ -9375,49 +9401,121 @@
           </a:bodyPr>
           <a:lstStyle/>
           <a:p>
-            <a:pPr lvl="0">
+            <a:pPr marL="457200" lvl="0" indent="0" algn="l" rtl="0">
+              <a:spcBef>
+                <a:spcPts val="0"/>
+              </a:spcBef>
+              <a:spcAft>
+                <a:spcPts val="0"/>
+              </a:spcAft>
+              <a:buNone/>
+            </a:pPr>
+            <a:endParaRPr sz="2200" dirty="0">
+              <a:solidFill>
+                <a:srgbClr val="F3F3F3"/>
+              </a:solidFill>
+              <a:latin typeface="+mj-lt"/>
+            </a:endParaRPr>
+          </a:p>
+          <a:p>
+            <a:pPr marL="457200" lvl="0" indent="-342900" algn="l" rtl="0">
               <a:spcBef>
                 <a:spcPts val="1600"/>
               </a:spcBef>
+              <a:spcAft>
+                <a:spcPts val="0"/>
+              </a:spcAft>
               <a:buClr>
                 <a:srgbClr val="F3F3F3"/>
               </a:buClr>
+              <a:buSzPts val="1800"/>
+              <a:buChar char="●"/>
             </a:pPr>
             <a:r>
-              <a:rPr lang="en-US" sz="2000" dirty="0">
+              <a:rPr lang="en-US" sz="3200" dirty="0">
                 <a:solidFill>
                   <a:srgbClr val="F3F3F3"/>
                 </a:solidFill>
                 <a:latin typeface="+mn-lt"/>
               </a:rPr>
-              <a:t>One hot encoder – converted category columns  - Zip code, bed and bath</a:t>
+              <a:t>Data Pre- Processing</a:t>
             </a:r>
           </a:p>
           <a:p>
-            <a:pPr lvl="0">
+            <a:pPr marL="457200" lvl="0" indent="-342900" algn="l" rtl="0">
               <a:spcBef>
                 <a:spcPts val="1600"/>
               </a:spcBef>
+              <a:spcAft>
+                <a:spcPts val="0"/>
+              </a:spcAft>
               <a:buClr>
                 <a:srgbClr val="F3F3F3"/>
               </a:buClr>
+              <a:buSzPts val="1800"/>
+              <a:buChar char="●"/>
             </a:pPr>
             <a:r>
-              <a:rPr lang="en-US" sz="2000" dirty="0">
+              <a:rPr lang="en-US" sz="3200" dirty="0">
                 <a:solidFill>
                   <a:srgbClr val="F3F3F3"/>
                 </a:solidFill>
                 <a:latin typeface="+mn-lt"/>
               </a:rPr>
-              <a:t>Merged new df with old ones and deleted old df to relieve memory use.</a:t>
+              <a:t>Split data into training and testing</a:t>
             </a:r>
+          </a:p>
+          <a:p>
+            <a:pPr marL="457200" lvl="0" indent="-342900" algn="l" rtl="0">
+              <a:spcBef>
+                <a:spcPts val="1600"/>
+              </a:spcBef>
+              <a:spcAft>
+                <a:spcPts val="0"/>
+              </a:spcAft>
+              <a:buClr>
+                <a:srgbClr val="F3F3F3"/>
+              </a:buClr>
+              <a:buSzPts val="1800"/>
+              <a:buChar char="●"/>
+            </a:pPr>
+            <a:r>
+              <a:rPr lang="en-US" sz="3200" dirty="0">
+                <a:solidFill>
+                  <a:srgbClr val="F3F3F3"/>
+                </a:solidFill>
+                <a:latin typeface="+mn-lt"/>
+              </a:rPr>
+              <a:t>Model Choice</a:t>
+            </a:r>
+          </a:p>
+          <a:p>
+            <a:pPr marL="457200" lvl="0" indent="-342900" algn="l" rtl="0">
+              <a:spcBef>
+                <a:spcPts val="1600"/>
+              </a:spcBef>
+              <a:spcAft>
+                <a:spcPts val="0"/>
+              </a:spcAft>
+              <a:buClr>
+                <a:srgbClr val="F3F3F3"/>
+              </a:buClr>
+              <a:buSzPts val="1800"/>
+              <a:buChar char="●"/>
+            </a:pPr>
+            <a:endParaRPr sz="3600" dirty="0">
+              <a:solidFill>
+                <a:srgbClr val="F3F3F3"/>
+              </a:solidFill>
+              <a:latin typeface="+mn-lt"/>
+            </a:endParaRPr>
           </a:p>
         </p:txBody>
       </p:sp>
     </p:spTree>
     <p:extLst>
       <p:ext uri="{BB962C8B-B14F-4D97-AF65-F5344CB8AC3E}">
-        <p14:creationId xmlns:p14="http://schemas.microsoft.com/office/powerpoint/2010/main" val="1864167225"/>
+        <p14:creationId xmlns:p14="http://schemas.microsoft.com/office/powerpoint/2010/main" val="1542820501"/>
       </p:ext>
     </p:extLst>
   </p:cSld>
@@ -9479,8 +9577,16 @@
               <a:buNone/>
             </a:pPr>
             <a:r>
+              <a:rPr lang="en" dirty="0"/>
+              <a:t>D</a:t>
+            </a:r>
+            <a:r>
+              <a:rPr lang="en-US" dirty="0" err="1"/>
+              <a:t>ata</a:t>
+            </a:r>
+            <a:r>
               <a:rPr lang="en-US" dirty="0"/>
-              <a:t>Split Data</a:t>
+              <a:t> Pre-Processing</a:t>
             </a:r>
             <a:endParaRPr dirty="0"/>
           </a:p>
@@ -9498,7 +9604,7 @@
         </p:nvSpPr>
         <p:spPr>
           <a:xfrm>
-            <a:off x="5200526" y="414098"/>
+            <a:off x="5041500" y="445904"/>
             <a:ext cx="3837000" cy="3695100"/>
           </a:xfrm>
           <a:prstGeom prst="rect">
@@ -9526,178 +9632,94 @@
                 </a:solidFill>
                 <a:latin typeface="+mn-lt"/>
               </a:rPr>
-              <a:t>Data was split into training and test sets.</a:t>
+              <a:t>Data Selection</a:t>
             </a:r>
           </a:p>
           <a:p>
-            <a:pPr lvl="0">
-              <a:spcBef>
-                <a:spcPts val="1600"/>
-              </a:spcBef>
+            <a:pPr lvl="1">
               <a:buClr>
                 <a:srgbClr val="F3F3F3"/>
               </a:buClr>
             </a:pPr>
             <a:r>
-              <a:rPr lang="en-US" dirty="0">
+              <a:rPr lang="en-US" sz="1800" dirty="0">
                 <a:solidFill>
                   <a:srgbClr val="F3F3F3"/>
                 </a:solidFill>
                 <a:latin typeface="+mn-lt"/>
               </a:rPr>
-              <a:t>Used transformed scaled data </a:t>
+              <a:t>Zillow scraping, IRS, Unemployment</a:t>
             </a:r>
           </a:p>
           <a:p>
-            <a:pPr lvl="0">
-              <a:spcBef>
-                <a:spcPts val="1600"/>
-              </a:spcBef>
+            <a:pPr lvl="1">
               <a:buClr>
                 <a:srgbClr val="F3F3F3"/>
               </a:buClr>
             </a:pPr>
             <a:r>
-              <a:rPr lang="en-US" dirty="0">
+              <a:rPr lang="en-US" sz="1800" dirty="0">
                 <a:solidFill>
                   <a:srgbClr val="F3F3F3"/>
                 </a:solidFill>
                 <a:latin typeface="+mn-lt"/>
               </a:rPr>
-              <a:t>Prediction : y – variable dependent variable is Price</a:t>
+              <a:t>Shortcomings: data missing zip code level</a:t>
             </a:r>
           </a:p>
           <a:p>
-            <a:pPr lvl="0">
-              <a:spcBef>
-                <a:spcPts val="1600"/>
-              </a:spcBef>
+            <a:pPr lvl="1">
               <a:buClr>
                 <a:srgbClr val="F3F3F3"/>
               </a:buClr>
             </a:pPr>
             <a:r>
-              <a:rPr lang="en-US" dirty="0">
+              <a:rPr lang="en-US" sz="1800" dirty="0">
                 <a:solidFill>
                   <a:srgbClr val="F3F3F3"/>
                 </a:solidFill>
                 <a:latin typeface="+mn-lt"/>
               </a:rPr>
-              <a:t>Independent variables – X – all other categories such as income, unemployment, # bed, # bath and </a:t>
+              <a:t>Workaround – translated data into zip code by </a:t>
             </a:r>
             <a:r>
-              <a:rPr lang="en-US" dirty="0" err="1">
+              <a:rPr lang="en-US" sz="1800" dirty="0" err="1">
                 <a:solidFill>
                   <a:srgbClr val="F3F3F3"/>
                 </a:solidFill>
                 <a:latin typeface="+mn-lt"/>
               </a:rPr>
-              <a:t>sqft</a:t>
+              <a:t>boro</a:t>
             </a:r>
-            <a:r>
-              <a:rPr lang="en-US" dirty="0">
-                <a:solidFill>
-                  <a:srgbClr val="F3F3F3"/>
-                </a:solidFill>
-                <a:latin typeface="+mn-lt"/>
-              </a:rPr>
-              <a:t>.</a:t>
-            </a:r>
-          </a:p>
-          <a:p>
-            <a:pPr lvl="0">
-              <a:spcBef>
-                <a:spcPts val="1600"/>
-              </a:spcBef>
+            <a:endParaRPr lang="en-US" sz="1800" dirty="0">
+              <a:solidFill>
+                <a:srgbClr val="F3F3F3"/>
+              </a:solidFill>
+              <a:latin typeface="+mn-lt"/>
+            </a:endParaRPr>
+          </a:p>
+          <a:p>
+            <a:pPr lvl="1">
               <a:buClr>
                 <a:srgbClr val="F3F3F3"/>
               </a:buClr>
             </a:pPr>
             <a:r>
-              <a:rPr lang="en-US" dirty="0">
+              <a:rPr lang="en-US" sz="1800" dirty="0">
                 <a:solidFill>
                   <a:srgbClr val="F3F3F3"/>
                 </a:solidFill>
                 <a:latin typeface="+mn-lt"/>
               </a:rPr>
-              <a:t>Data is split into </a:t>
+              <a:t>Redundancy in data</a:t>
             </a:r>
-            <a:r>
-              <a:rPr lang="en-US" dirty="0" err="1">
-                <a:solidFill>
-                  <a:srgbClr val="F3F3F3"/>
-                </a:solidFill>
-                <a:latin typeface="+mn-lt"/>
-              </a:rPr>
-              <a:t>X_train</a:t>
-            </a:r>
-            <a:r>
-              <a:rPr lang="en-US" dirty="0">
-                <a:solidFill>
-                  <a:srgbClr val="F3F3F3"/>
-                </a:solidFill>
-                <a:latin typeface="+mn-lt"/>
-              </a:rPr>
-              <a:t>, </a:t>
-            </a:r>
-            <a:r>
-              <a:rPr lang="en-US" dirty="0" err="1">
-                <a:solidFill>
-                  <a:srgbClr val="F3F3F3"/>
-                </a:solidFill>
-                <a:latin typeface="+mn-lt"/>
-              </a:rPr>
-              <a:t>X_test</a:t>
-            </a:r>
-            <a:r>
-              <a:rPr lang="en-US" dirty="0">
-                <a:solidFill>
-                  <a:srgbClr val="F3F3F3"/>
-                </a:solidFill>
-                <a:latin typeface="+mn-lt"/>
-              </a:rPr>
-              <a:t>, </a:t>
-            </a:r>
-            <a:r>
-              <a:rPr lang="en-US" dirty="0" err="1">
-                <a:solidFill>
-                  <a:srgbClr val="F3F3F3"/>
-                </a:solidFill>
-                <a:latin typeface="+mn-lt"/>
-              </a:rPr>
-              <a:t>y_train</a:t>
-            </a:r>
-            <a:r>
-              <a:rPr lang="en-US" dirty="0">
-                <a:solidFill>
-                  <a:srgbClr val="F3F3F3"/>
-                </a:solidFill>
-                <a:latin typeface="+mn-lt"/>
-              </a:rPr>
-              <a:t> and </a:t>
-            </a:r>
-            <a:r>
-              <a:rPr lang="en-US" dirty="0" err="1">
-                <a:solidFill>
-                  <a:srgbClr val="F3F3F3"/>
-                </a:solidFill>
-                <a:latin typeface="+mn-lt"/>
-              </a:rPr>
-              <a:t>y_test</a:t>
-            </a:r>
-            <a:endParaRPr lang="en-US" dirty="0">
-              <a:solidFill>
-                <a:srgbClr val="F3F3F3"/>
-              </a:solidFill>
-              <a:latin typeface="+mn-lt"/>
-            </a:endParaRPr>
           </a:p>
         </p:txBody>
       </p:sp>
     </p:spTree>
     <p:extLst>
       <p:ext uri="{BB962C8B-B14F-4D97-AF65-F5344CB8AC3E}">
-        <p14:creationId xmlns:p14="http://schemas.microsoft.com/office/powerpoint/2010/main" val="1270834312"/>
+        <p14:creationId xmlns:p14="http://schemas.microsoft.com/office/powerpoint/2010/main" val="1537835849"/>
       </p:ext>
     </p:extLst>
   </p:cSld>
@@ -9759,6 +9781,635 @@
               <a:buNone/>
             </a:pPr>
             <a:r>
+              <a:rPr lang="en" dirty="0"/>
+              <a:t>D</a:t>
+            </a:r>
+            <a:r>
+              <a:rPr lang="en-US" dirty="0" err="1"/>
+              <a:t>ata</a:t>
+            </a:r>
+            <a:r>
+              <a:rPr lang="en-US" dirty="0"/>
+              <a:t> Pre-Processing</a:t>
+            </a:r>
+            <a:endParaRPr dirty="0"/>
+          </a:p>
+        </p:txBody>
+      </p:sp>
+      <p:sp>
+        <p:nvSpPr>
+          <p:cNvPr id="79" name="Google Shape;79;p16"/>
+          <p:cNvSpPr txBox="1">
+            <a:spLocks noGrp="1"/>
+          </p:cNvSpPr>
+          <p:nvPr>
+            <p:ph type="body" idx="2"/>
+          </p:nvPr>
+        </p:nvSpPr>
+        <p:spPr>
+          <a:xfrm>
+            <a:off x="5041500" y="445904"/>
+            <a:ext cx="3837000" cy="3695100"/>
+          </a:xfrm>
+          <a:prstGeom prst="rect">
+            <a:avLst/>
+          </a:prstGeom>
+        </p:spPr>
+        <p:txBody>
+          <a:bodyPr spcFirstLastPara="1" wrap="square" lIns="91425" tIns="91425" rIns="91425" bIns="91425" anchor="ctr" anchorCtr="0">
+            <a:noAutofit/>
+          </a:bodyPr>
+          <a:lstStyle/>
+          <a:p>
+            <a:pPr lvl="0">
+              <a:spcBef>
+                <a:spcPts val="1600"/>
+              </a:spcBef>
+              <a:buClr>
+                <a:srgbClr val="F3F3F3"/>
+              </a:buClr>
+            </a:pPr>
+            <a:r>
+              <a:rPr lang="en-US" dirty="0">
+                <a:solidFill>
+                  <a:srgbClr val="F3F3F3"/>
+                </a:solidFill>
+                <a:latin typeface="+mn-lt"/>
+              </a:rPr>
+              <a:t>Data Processing</a:t>
+            </a:r>
+          </a:p>
+          <a:p>
+            <a:pPr lvl="1">
+              <a:buClr>
+                <a:srgbClr val="F3F3F3"/>
+              </a:buClr>
+            </a:pPr>
+            <a:r>
+              <a:rPr lang="en-US" sz="1800" dirty="0">
+                <a:solidFill>
+                  <a:srgbClr val="F3F3F3"/>
+                </a:solidFill>
+                <a:latin typeface="+mn-lt"/>
+              </a:rPr>
+              <a:t>Data formatting, cleaning and sampling</a:t>
+            </a:r>
+          </a:p>
+          <a:p>
+            <a:pPr lvl="1">
+              <a:buClr>
+                <a:srgbClr val="F3F3F3"/>
+              </a:buClr>
+            </a:pPr>
+            <a:r>
+              <a:rPr lang="en-US" sz="1800" dirty="0">
+                <a:solidFill>
+                  <a:srgbClr val="F3F3F3"/>
+                </a:solidFill>
+                <a:latin typeface="+mn-lt"/>
+              </a:rPr>
+              <a:t>Dropped null values</a:t>
+            </a:r>
+          </a:p>
+          <a:p>
+            <a:pPr lvl="1">
+              <a:buClr>
+                <a:srgbClr val="F3F3F3"/>
+              </a:buClr>
+            </a:pPr>
+            <a:r>
+              <a:rPr lang="en-US" sz="1800" dirty="0">
+                <a:solidFill>
+                  <a:srgbClr val="F3F3F3"/>
+                </a:solidFill>
+                <a:latin typeface="+mn-lt"/>
+              </a:rPr>
+              <a:t>Data type conversions</a:t>
+            </a:r>
+          </a:p>
+          <a:p>
+            <a:pPr lvl="1">
+              <a:buClr>
+                <a:srgbClr val="F3F3F3"/>
+              </a:buClr>
+            </a:pPr>
+            <a:r>
+              <a:rPr lang="en-US" sz="1800" dirty="0">
+                <a:solidFill>
+                  <a:srgbClr val="F3F3F3"/>
+                </a:solidFill>
+                <a:latin typeface="+mn-lt"/>
+              </a:rPr>
+              <a:t>Bucketing data</a:t>
+            </a:r>
+          </a:p>
+          <a:p>
+            <a:pPr lvl="1">
+              <a:buClr>
+                <a:srgbClr val="F3F3F3"/>
+              </a:buClr>
+            </a:pPr>
+            <a:r>
+              <a:rPr lang="en-US" sz="1800" dirty="0">
+                <a:solidFill>
+                  <a:srgbClr val="F3F3F3"/>
+                </a:solidFill>
+                <a:latin typeface="+mn-lt"/>
+              </a:rPr>
+              <a:t>Dropped outliers </a:t>
+            </a:r>
+          </a:p>
+        </p:txBody>
+      </p:sp>
+    </p:spTree>
+    <p:extLst>
+      <p:ext uri="{BB962C8B-B14F-4D97-AF65-F5344CB8AC3E}">
+        <p14:creationId xmlns:p14="http://schemas.microsoft.com/office/powerpoint/2010/main" val="2658748149"/>
+      </p:ext>
+    </p:extLst>
+  </p:cSld>
+  <p:clrMapOvr>
+    <a:masterClrMapping/>
+  </p:clrMapOvr>
+</p:sld>
+</file>
+
+<file path=ppt/slides/slide13.xml><?xml version="1.0" encoding="utf-8"?>
+<p:sld xmlns:a="http://schemas.openxmlformats.org/drawingml/2006/main" xmlns:r="http://schemas.openxmlformats.org/officeDocument/2006/relationships" xmlns:p="http://schemas.openxmlformats.org/presentationml/2006/main">
+  <p:cSld>
+    <p:spTree>
+      <p:nvGrpSpPr>
+        <p:cNvPr id="1" name="Shape 76"/>
+        <p:cNvGrpSpPr/>
+        <p:nvPr/>
+      </p:nvGrpSpPr>
+      <p:grpSpPr>
+        <a:xfrm>
+          <a:off x="0" y="0"/>
+          <a:ext cx="0" cy="0"/>
+          <a:chOff x="0" y="0"/>
+          <a:chExt cx="0" cy="0"/>
+        </a:xfrm>
+      </p:grpSpPr>
+      <p:sp>
+        <p:nvSpPr>
+          <p:cNvPr id="77" name="Google Shape;77;p16"/>
+          <p:cNvSpPr txBox="1">
+            <a:spLocks noGrp="1"/>
+          </p:cNvSpPr>
+          <p:nvPr>
+            <p:ph type="title"/>
+          </p:nvPr>
+        </p:nvSpPr>
+        <p:spPr>
+          <a:xfrm>
+            <a:off x="265500" y="1382350"/>
+            <a:ext cx="4045200" cy="1333200"/>
+          </a:xfrm>
+          <a:prstGeom prst="rect">
+            <a:avLst/>
+          </a:prstGeom>
+        </p:spPr>
+        <p:txBody>
+          <a:bodyPr spcFirstLastPara="1" wrap="square" lIns="91425" tIns="91425" rIns="91425" bIns="91425" anchor="b" anchorCtr="0">
+            <a:noAutofit/>
+          </a:bodyPr>
+          <a:lstStyle/>
+          <a:p>
+            <a:pPr marL="0" lvl="0" indent="0" algn="ctr" rtl="0">
+              <a:spcBef>
+                <a:spcPts val="0"/>
+              </a:spcBef>
+              <a:spcAft>
+                <a:spcPts val="0"/>
+              </a:spcAft>
+              <a:buNone/>
+            </a:pPr>
+            <a:r>
+              <a:rPr lang="en" dirty="0"/>
+              <a:t>D</a:t>
+            </a:r>
+            <a:r>
+              <a:rPr lang="en-US" dirty="0" err="1"/>
+              <a:t>ata</a:t>
+            </a:r>
+            <a:r>
+              <a:rPr lang="en-US" dirty="0"/>
+              <a:t> Transformation</a:t>
+            </a:r>
+            <a:endParaRPr dirty="0"/>
+          </a:p>
+        </p:txBody>
+      </p:sp>
+      <p:sp>
+        <p:nvSpPr>
+          <p:cNvPr id="79" name="Google Shape;79;p16"/>
+          <p:cNvSpPr txBox="1">
+            <a:spLocks noGrp="1"/>
+          </p:cNvSpPr>
+          <p:nvPr>
+            <p:ph type="body" idx="2"/>
+          </p:nvPr>
+        </p:nvSpPr>
+        <p:spPr>
+          <a:xfrm>
+            <a:off x="5041500" y="445904"/>
+            <a:ext cx="3837000" cy="3695100"/>
+          </a:xfrm>
+          <a:prstGeom prst="rect">
+            <a:avLst/>
+          </a:prstGeom>
+        </p:spPr>
+        <p:txBody>
+          <a:bodyPr spcFirstLastPara="1" wrap="square" lIns="91425" tIns="91425" rIns="91425" bIns="91425" anchor="ctr" anchorCtr="0">
+            <a:noAutofit/>
+          </a:bodyPr>
+          <a:lstStyle/>
+          <a:p>
+            <a:pPr lvl="0">
+              <a:spcBef>
+                <a:spcPts val="1600"/>
+              </a:spcBef>
+              <a:buClr>
+                <a:srgbClr val="F3F3F3"/>
+              </a:buClr>
+            </a:pPr>
+            <a:r>
+              <a:rPr lang="en-US" sz="2000" dirty="0">
+                <a:solidFill>
+                  <a:srgbClr val="F3F3F3"/>
+                </a:solidFill>
+                <a:latin typeface="+mn-lt"/>
+              </a:rPr>
+              <a:t>One hot encoder – converted category columns  - Zip code, bed and bath</a:t>
+            </a:r>
+          </a:p>
+          <a:p>
+            <a:pPr lvl="0">
+              <a:spcBef>
+                <a:spcPts val="1600"/>
+              </a:spcBef>
+              <a:buClr>
+                <a:srgbClr val="F3F3F3"/>
+              </a:buClr>
+            </a:pPr>
+            <a:r>
+              <a:rPr lang="en-US" sz="2000" dirty="0">
+                <a:solidFill>
+                  <a:srgbClr val="F3F3F3"/>
+                </a:solidFill>
+                <a:latin typeface="+mn-lt"/>
+              </a:rPr>
+              <a:t>Merged new df with old ones and deleted old df to relieve memory use.</a:t>
+            </a:r>
+          </a:p>
+        </p:txBody>
+      </p:sp>
+    </p:spTree>
+    <p:extLst>
+      <p:ext uri="{BB962C8B-B14F-4D97-AF65-F5344CB8AC3E}">
+        <p14:creationId xmlns:p14="http://schemas.microsoft.com/office/powerpoint/2010/main" val="1864167225"/>
+      </p:ext>
+    </p:extLst>
+  </p:cSld>
+  <p:clrMapOvr>
+    <a:masterClrMapping/>
+  </p:clrMapOvr>
+</p:sld>
+</file>
+
+<file path=ppt/slides/slide14.xml><?xml version="1.0" encoding="utf-8"?>
+<p:sld xmlns:a="http://schemas.openxmlformats.org/drawingml/2006/main" xmlns:r="http://schemas.openxmlformats.org/officeDocument/2006/relationships" xmlns:p="http://schemas.openxmlformats.org/presentationml/2006/main">
+  <p:cSld>
+    <p:spTree>
+      <p:nvGrpSpPr>
+        <p:cNvPr id="1" name="Shape 76"/>
+        <p:cNvGrpSpPr/>
+        <p:nvPr/>
+      </p:nvGrpSpPr>
+      <p:grpSpPr>
+        <a:xfrm>
+          <a:off x="0" y="0"/>
+          <a:ext cx="0" cy="0"/>
+          <a:chOff x="0" y="0"/>
+          <a:chExt cx="0" cy="0"/>
+        </a:xfrm>
+      </p:grpSpPr>
+      <p:sp>
+        <p:nvSpPr>
+          <p:cNvPr id="77" name="Google Shape;77;p16"/>
+          <p:cNvSpPr txBox="1">
+            <a:spLocks noGrp="1"/>
+          </p:cNvSpPr>
+          <p:nvPr>
+            <p:ph type="title"/>
+          </p:nvPr>
+        </p:nvSpPr>
+        <p:spPr>
+          <a:xfrm>
+            <a:off x="265500" y="1382350"/>
+            <a:ext cx="4045200" cy="1333200"/>
+          </a:xfrm>
+          <a:prstGeom prst="rect">
+            <a:avLst/>
+          </a:prstGeom>
+        </p:spPr>
+        <p:txBody>
+          <a:bodyPr spcFirstLastPara="1" wrap="square" lIns="91425" tIns="91425" rIns="91425" bIns="91425" anchor="b" anchorCtr="0">
+            <a:noAutofit/>
+          </a:bodyPr>
+          <a:lstStyle/>
+          <a:p>
+            <a:pPr marL="0" lvl="0" indent="0" algn="ctr" rtl="0">
+              <a:spcBef>
+                <a:spcPts val="0"/>
+              </a:spcBef>
+              <a:spcAft>
+                <a:spcPts val="0"/>
+              </a:spcAft>
+              <a:buNone/>
+            </a:pPr>
+            <a:r>
+              <a:rPr lang="en-US" dirty="0"/>
+              <a:t>Split Data</a:t>
+            </a:r>
+            <a:endParaRPr dirty="0"/>
+          </a:p>
+        </p:txBody>
+      </p:sp>
+      <p:sp>
+        <p:nvSpPr>
+          <p:cNvPr id="79" name="Google Shape;79;p16"/>
+          <p:cNvSpPr txBox="1">
+            <a:spLocks noGrp="1"/>
+          </p:cNvSpPr>
+          <p:nvPr>
+            <p:ph type="body" idx="2"/>
+          </p:nvPr>
+        </p:nvSpPr>
+        <p:spPr>
+          <a:xfrm>
+            <a:off x="5200526" y="414098"/>
+            <a:ext cx="3837000" cy="3695100"/>
+          </a:xfrm>
+          <a:prstGeom prst="rect">
+            <a:avLst/>
+          </a:prstGeom>
+        </p:spPr>
+        <p:txBody>
+          <a:bodyPr spcFirstLastPara="1" wrap="square" lIns="91425" tIns="91425" rIns="91425" bIns="91425" anchor="ctr" anchorCtr="0">
+            <a:noAutofit/>
+          </a:bodyPr>
+          <a:lstStyle/>
+          <a:p>
+            <a:pPr lvl="0">
+              <a:spcBef>
+                <a:spcPts val="1600"/>
+              </a:spcBef>
+              <a:buClr>
+                <a:srgbClr val="F3F3F3"/>
+              </a:buClr>
+            </a:pPr>
+            <a:r>
+              <a:rPr lang="en-US" dirty="0">
+                <a:solidFill>
+                  <a:srgbClr val="F3F3F3"/>
+                </a:solidFill>
+                <a:latin typeface="+mn-lt"/>
+              </a:rPr>
+              <a:t>Data was split into training and test sets.</a:t>
+            </a:r>
+          </a:p>
+          <a:p>
+            <a:pPr lvl="0">
+              <a:spcBef>
+                <a:spcPts val="1600"/>
+              </a:spcBef>
+              <a:buClr>
+                <a:srgbClr val="F3F3F3"/>
+              </a:buClr>
+            </a:pPr>
+            <a:r>
+              <a:rPr lang="en-US" dirty="0">
+                <a:solidFill>
+                  <a:srgbClr val="F3F3F3"/>
+                </a:solidFill>
+                <a:latin typeface="+mn-lt"/>
+              </a:rPr>
+              <a:t>Used transformed scaled data </a:t>
+            </a:r>
+          </a:p>
+          <a:p>
+            <a:pPr lvl="0">
+              <a:spcBef>
+                <a:spcPts val="1600"/>
+              </a:spcBef>
+              <a:buClr>
+                <a:srgbClr val="F3F3F3"/>
+              </a:buClr>
+            </a:pPr>
+            <a:r>
+              <a:rPr lang="en-US" dirty="0">
+                <a:solidFill>
+                  <a:srgbClr val="F3F3F3"/>
+                </a:solidFill>
+                <a:latin typeface="+mn-lt"/>
+              </a:rPr>
+              <a:t>Prediction : y – variable dependent variable is Price</a:t>
+            </a:r>
+          </a:p>
+          <a:p>
+            <a:pPr lvl="0">
+              <a:spcBef>
+                <a:spcPts val="1600"/>
+              </a:spcBef>
+              <a:buClr>
+                <a:srgbClr val="F3F3F3"/>
+              </a:buClr>
+            </a:pPr>
+            <a:r>
+              <a:rPr lang="en-US" dirty="0">
+                <a:solidFill>
+                  <a:srgbClr val="F3F3F3"/>
+                </a:solidFill>
+                <a:latin typeface="+mn-lt"/>
+              </a:rPr>
+              <a:t>Independent variables – X – all other categories such as income, unemployment, # bed, # bath and </a:t>
+            </a:r>
+            <a:r>
+              <a:rPr lang="en-US" dirty="0" err="1">
+                <a:solidFill>
+                  <a:srgbClr val="F3F3F3"/>
+                </a:solidFill>
+                <a:latin typeface="+mn-lt"/>
+              </a:rPr>
+              <a:t>sqft</a:t>
+            </a:r>
+            <a:r>
+              <a:rPr lang="en-US" dirty="0">
+                <a:solidFill>
+                  <a:srgbClr val="F3F3F3"/>
+                </a:solidFill>
+                <a:latin typeface="+mn-lt"/>
+              </a:rPr>
+              <a:t>.</a:t>
+            </a:r>
+          </a:p>
+          <a:p>
+            <a:pPr lvl="0">
+              <a:spcBef>
+                <a:spcPts val="1600"/>
+              </a:spcBef>
+              <a:buClr>
+                <a:srgbClr val="F3F3F3"/>
+              </a:buClr>
+            </a:pPr>
+            <a:r>
+              <a:rPr lang="en-US" dirty="0">
+                <a:solidFill>
+                  <a:srgbClr val="F3F3F3"/>
+                </a:solidFill>
+                <a:latin typeface="+mn-lt"/>
+              </a:rPr>
+              <a:t>Data is split into </a:t>
+            </a:r>
+            <a:r>
+              <a:rPr lang="en-US" dirty="0" err="1">
+                <a:solidFill>
+                  <a:srgbClr val="F3F3F3"/>
+                </a:solidFill>
+                <a:latin typeface="+mn-lt"/>
+              </a:rPr>
+              <a:t>X_train</a:t>
+            </a:r>
+            <a:r>
+              <a:rPr lang="en-US" dirty="0">
+                <a:solidFill>
+                  <a:srgbClr val="F3F3F3"/>
+                </a:solidFill>
+                <a:latin typeface="+mn-lt"/>
+              </a:rPr>
+              <a:t>, </a:t>
+            </a:r>
+            <a:r>
+              <a:rPr lang="en-US" dirty="0" err="1">
+                <a:solidFill>
+                  <a:srgbClr val="F3F3F3"/>
+                </a:solidFill>
+                <a:latin typeface="+mn-lt"/>
+              </a:rPr>
+              <a:t>X_test</a:t>
+            </a:r>
+            <a:r>
+              <a:rPr lang="en-US" dirty="0">
+                <a:solidFill>
+                  <a:srgbClr val="F3F3F3"/>
+                </a:solidFill>
+                <a:latin typeface="+mn-lt"/>
+              </a:rPr>
+              <a:t>, </a:t>
+            </a:r>
+            <a:r>
+              <a:rPr lang="en-US" dirty="0" err="1">
+                <a:solidFill>
+                  <a:srgbClr val="F3F3F3"/>
+                </a:solidFill>
+                <a:latin typeface="+mn-lt"/>
+              </a:rPr>
+              <a:t>y_train</a:t>
+            </a:r>
+            <a:r>
+              <a:rPr lang="en-US" dirty="0">
+                <a:solidFill>
+                  <a:srgbClr val="F3F3F3"/>
+                </a:solidFill>
+                <a:latin typeface="+mn-lt"/>
+              </a:rPr>
+              <a:t> and </a:t>
+            </a:r>
+            <a:r>
+              <a:rPr lang="en-US" dirty="0" err="1">
+                <a:solidFill>
+                  <a:srgbClr val="F3F3F3"/>
+                </a:solidFill>
+                <a:latin typeface="+mn-lt"/>
+              </a:rPr>
+              <a:t>y_test</a:t>
+            </a:r>
+            <a:endParaRPr lang="en-US" dirty="0">
+              <a:solidFill>
+                <a:srgbClr val="F3F3F3"/>
+              </a:solidFill>
+              <a:latin typeface="+mn-lt"/>
+            </a:endParaRPr>
+          </a:p>
+        </p:txBody>
+      </p:sp>
+    </p:spTree>
+    <p:extLst>
+      <p:ext uri="{BB962C8B-B14F-4D97-AF65-F5344CB8AC3E}">
+        <p14:creationId xmlns:p14="http://schemas.microsoft.com/office/powerpoint/2010/main" val="1270834312"/>
+      </p:ext>
+    </p:extLst>
+  </p:cSld>
+  <p:clrMapOvr>
+    <a:masterClrMapping/>
+  </p:clrMapOvr>
+</p:sld>
+</file>
+
+<file path=ppt/slides/slide15.xml><?xml version="1.0" encoding="utf-8"?>
+<p:sld xmlns:a="http://schemas.openxmlformats.org/drawingml/2006/main" xmlns:r="http://schemas.openxmlformats.org/officeDocument/2006/relationships" xmlns:p="http://schemas.openxmlformats.org/presentationml/2006/main">
+  <p:cSld>
+    <p:spTree>
+      <p:nvGrpSpPr>
+        <p:cNvPr id="1" name="Shape 76"/>
+        <p:cNvGrpSpPr/>
+        <p:nvPr/>
+      </p:nvGrpSpPr>
+      <p:grpSpPr>
+        <a:xfrm>
+          <a:off x="0" y="0"/>
+          <a:ext cx="0" cy="0"/>
+          <a:chOff x="0" y="0"/>
+          <a:chExt cx="0" cy="0"/>
+        </a:xfrm>
+      </p:grpSpPr>
+      <p:sp>
+        <p:nvSpPr>
+          <p:cNvPr id="77" name="Google Shape;77;p16"/>
+          <p:cNvSpPr txBox="1">
+            <a:spLocks noGrp="1"/>
+          </p:cNvSpPr>
+          <p:nvPr>
+            <p:ph type="title"/>
+          </p:nvPr>
+        </p:nvSpPr>
+        <p:spPr>
+          <a:xfrm>
+            <a:off x="265500" y="1382350"/>
+            <a:ext cx="4045200" cy="1333200"/>
+          </a:xfrm>
+          <a:prstGeom prst="rect">
+            <a:avLst/>
+          </a:prstGeom>
+        </p:spPr>
+        <p:txBody>
+          <a:bodyPr spcFirstLastPara="1" wrap="square" lIns="91425" tIns="91425" rIns="91425" bIns="91425" anchor="b" anchorCtr="0">
+            <a:noAutofit/>
+          </a:bodyPr>
+          <a:lstStyle/>
+          <a:p>
+            <a:pPr marL="0" lvl="0" indent="0" algn="ctr" rtl="0">
+              <a:spcBef>
+                <a:spcPts val="0"/>
+              </a:spcBef>
+              <a:spcAft>
+                <a:spcPts val="0"/>
+              </a:spcAft>
+              <a:buNone/>
+            </a:pPr>
+            <a:r>
               <a:rPr lang="en-US" dirty="0"/>
               <a:t>Model Choice</a:t>
             </a:r>
@@ -9899,7 +10550,7 @@
 </p:sld>
 </file>
 
-<file path=ppt/slides/slide13.xml><?xml version="1.0" encoding="utf-8"?>
+<file path=ppt/slides/slide16.xml><?xml version="1.0" encoding="utf-8"?>
 <p:sld xmlns:a="http://schemas.openxmlformats.org/drawingml/2006/main" xmlns:r="http://schemas.openxmlformats.org/officeDocument/2006/relationships" xmlns:p="http://schemas.openxmlformats.org/presentationml/2006/main">
   <p:cSld>
     <p:spTree>
@@ -9966,7 +10617,7 @@
 </p:sld>
 </file>
 
-<file path=ppt/slides/slide14.xml><?xml version="1.0" encoding="utf-8"?>
+<file path=ppt/slides/slide17.xml><?xml version="1.0" encoding="utf-8"?>
 <p:sld xmlns:a="http://schemas.openxmlformats.org/drawingml/2006/main" xmlns:r="http://schemas.openxmlformats.org/officeDocument/2006/relationships" xmlns:p="http://schemas.openxmlformats.org/presentationml/2006/main">
   <p:cSld>
     <p:spTree>
@@ -10018,7 +10669,7 @@
 </p:sld>
 </file>
 
-<file path=ppt/slides/slide15.xml><?xml version="1.0" encoding="utf-8"?>
+<file path=ppt/slides/slide18.xml><?xml version="1.0" encoding="utf-8"?>
 <p:sld xmlns:a="http://schemas.openxmlformats.org/drawingml/2006/main" xmlns:r="http://schemas.openxmlformats.org/officeDocument/2006/relationships" xmlns:p="http://schemas.openxmlformats.org/presentationml/2006/main">
   <p:cSld>
     <p:spTree>
@@ -10070,7 +10721,7 @@
 </p:sld>
 </file>
 
-<file path=ppt/slides/slide16.xml><?xml version="1.0" encoding="utf-8"?>
+<file path=ppt/slides/slide19.xml><?xml version="1.0" encoding="utf-8"?>
 <p:sld xmlns:a="http://schemas.openxmlformats.org/drawingml/2006/main" xmlns:r="http://schemas.openxmlformats.org/officeDocument/2006/relationships" xmlns:p="http://schemas.openxmlformats.org/presentationml/2006/main">
   <p:cSld>
     <p:spTree>
@@ -10104,162 +10755,6 @@
           <a:xfrm>
             <a:off x="1527150" y="95475"/>
             <a:ext cx="5535876" cy="4897125"/>
-          </a:xfrm>
-          <a:prstGeom prst="rect">
-            <a:avLst/>
-          </a:prstGeom>
-          <a:noFill/>
-          <a:ln>
-            <a:noFill/>
-          </a:ln>
-        </p:spPr>
-      </p:pic>
-    </p:spTree>
-  </p:cSld>
-  <p:clrMapOvr>
-    <a:masterClrMapping/>
-  </p:clrMapOvr>
-</p:sld>
-</file>
-
-<file path=ppt/slides/slide17.xml><?xml version="1.0" encoding="utf-8"?>
-<p:sld xmlns:a="http://schemas.openxmlformats.org/drawingml/2006/main" xmlns:r="http://schemas.openxmlformats.org/officeDocument/2006/relationships" xmlns:p="http://schemas.openxmlformats.org/presentationml/2006/main">
-  <p:cSld>
-    <p:spTree>
-      <p:nvGrpSpPr>
-        <p:cNvPr id="1" name="Shape 117"/>
-        <p:cNvGrpSpPr/>
-        <p:nvPr/>
-      </p:nvGrpSpPr>
-      <p:grpSpPr>
-        <a:xfrm>
-          <a:off x="0" y="0"/>
-          <a:ext cx="0" cy="0"/>
-          <a:chOff x="0" y="0"/>
-          <a:chExt cx="0" cy="0"/>
-        </a:xfrm>
-      </p:grpSpPr>
-      <p:pic>
-        <p:nvPicPr>
-          <p:cNvPr id="118" name="Google Shape;118;p23"/>
-          <p:cNvPicPr preferRelativeResize="0"/>
-          <p:nvPr/>
-        </p:nvPicPr>
-        <p:blipFill rotWithShape="1">
-          <a:blip r:embed="rId3">
-            <a:alphaModFix/>
-          </a:blip>
-          <a:srcRect t="5303" r="1048"/>
-          <a:stretch/>
-        </p:blipFill>
-        <p:spPr>
-          <a:xfrm>
-            <a:off x="1488650" y="74225"/>
-            <a:ext cx="5404674" cy="4900250"/>
-          </a:xfrm>
-          <a:prstGeom prst="rect">
-            <a:avLst/>
-          </a:prstGeom>
-          <a:noFill/>
-          <a:ln>
-            <a:noFill/>
-          </a:ln>
-        </p:spPr>
-      </p:pic>
-    </p:spTree>
-  </p:cSld>
-  <p:clrMapOvr>
-    <a:masterClrMapping/>
-  </p:clrMapOvr>
-</p:sld>
-</file>
-
-<file path=ppt/slides/slide18.xml><?xml version="1.0" encoding="utf-8"?>
-<p:sld xmlns:a="http://schemas.openxmlformats.org/drawingml/2006/main" xmlns:r="http://schemas.openxmlformats.org/officeDocument/2006/relationships" xmlns:p="http://schemas.openxmlformats.org/presentationml/2006/main">
-  <p:cSld>
-    <p:spTree>
-      <p:nvGrpSpPr>
-        <p:cNvPr id="1" name="Shape 122"/>
-        <p:cNvGrpSpPr/>
-        <p:nvPr/>
-      </p:nvGrpSpPr>
-      <p:grpSpPr>
-        <a:xfrm>
-          <a:off x="0" y="0"/>
-          <a:ext cx="0" cy="0"/>
-          <a:chOff x="0" y="0"/>
-          <a:chExt cx="0" cy="0"/>
-        </a:xfrm>
-      </p:grpSpPr>
-      <p:pic>
-        <p:nvPicPr>
-          <p:cNvPr id="123" name="Google Shape;123;p24"/>
-          <p:cNvPicPr preferRelativeResize="0"/>
-          <p:nvPr/>
-        </p:nvPicPr>
-        <p:blipFill rotWithShape="1">
-          <a:blip r:embed="rId3">
-            <a:alphaModFix/>
-          </a:blip>
-          <a:srcRect t="5033" r="1312"/>
-          <a:stretch/>
-        </p:blipFill>
-        <p:spPr>
-          <a:xfrm>
-            <a:off x="1896163" y="132413"/>
-            <a:ext cx="5351674" cy="4878675"/>
-          </a:xfrm>
-          <a:prstGeom prst="rect">
-            <a:avLst/>
-          </a:prstGeom>
-          <a:noFill/>
-          <a:ln>
-            <a:noFill/>
-          </a:ln>
-        </p:spPr>
-      </p:pic>
-    </p:spTree>
-  </p:cSld>
-  <p:clrMapOvr>
-    <a:masterClrMapping/>
-  </p:clrMapOvr>
-</p:sld>
-</file>
-
-<file path=ppt/slides/slide19.xml><?xml version="1.0" encoding="utf-8"?>
-<p:sld xmlns:a="http://schemas.openxmlformats.org/drawingml/2006/main" xmlns:r="http://schemas.openxmlformats.org/officeDocument/2006/relationships" xmlns:p="http://schemas.openxmlformats.org/presentationml/2006/main">
-  <p:cSld>
-    <p:spTree>
-      <p:nvGrpSpPr>
-        <p:cNvPr id="1" name="Shape 127"/>
-        <p:cNvGrpSpPr/>
-        <p:nvPr/>
-      </p:nvGrpSpPr>
-      <p:grpSpPr>
-        <a:xfrm>
-          <a:off x="0" y="0"/>
-          <a:ext cx="0" cy="0"/>
-          <a:chOff x="0" y="0"/>
-          <a:chExt cx="0" cy="0"/>
-        </a:xfrm>
-      </p:grpSpPr>
-      <p:pic>
-        <p:nvPicPr>
-          <p:cNvPr id="128" name="Google Shape;128;p25"/>
-          <p:cNvPicPr preferRelativeResize="0"/>
-          <p:nvPr/>
-        </p:nvPicPr>
-        <p:blipFill rotWithShape="1">
-          <a:blip r:embed="rId3">
-            <a:alphaModFix/>
-          </a:blip>
-          <a:srcRect t="5303" r="1312"/>
-          <a:stretch/>
-        </p:blipFill>
-        <p:spPr>
-          <a:xfrm>
-            <a:off x="1890863" y="134525"/>
-            <a:ext cx="5362275" cy="4874450"/>
           </a:xfrm>
           <a:prstGeom prst="rect">
             <a:avLst/>
@@ -10421,6 +10916,162 @@
   <p:cSld>
     <p:spTree>
       <p:nvGrpSpPr>
+        <p:cNvPr id="1" name="Shape 117"/>
+        <p:cNvGrpSpPr/>
+        <p:nvPr/>
+      </p:nvGrpSpPr>
+      <p:grpSpPr>
+        <a:xfrm>
+          <a:off x="0" y="0"/>
+          <a:ext cx="0" cy="0"/>
+          <a:chOff x="0" y="0"/>
+          <a:chExt cx="0" cy="0"/>
+        </a:xfrm>
+      </p:grpSpPr>
+      <p:pic>
+        <p:nvPicPr>
+          <p:cNvPr id="118" name="Google Shape;118;p23"/>
+          <p:cNvPicPr preferRelativeResize="0"/>
+          <p:nvPr/>
+        </p:nvPicPr>
+        <p:blipFill rotWithShape="1">
+          <a:blip r:embed="rId3">
+            <a:alphaModFix/>
+          </a:blip>
+          <a:srcRect t="5303" r="1048"/>
+          <a:stretch/>
+        </p:blipFill>
+        <p:spPr>
+          <a:xfrm>
+            <a:off x="1488650" y="74225"/>
+            <a:ext cx="5404674" cy="4900250"/>
+          </a:xfrm>
+          <a:prstGeom prst="rect">
+            <a:avLst/>
+          </a:prstGeom>
+          <a:noFill/>
+          <a:ln>
+            <a:noFill/>
+          </a:ln>
+        </p:spPr>
+      </p:pic>
+    </p:spTree>
+  </p:cSld>
+  <p:clrMapOvr>
+    <a:masterClrMapping/>
+  </p:clrMapOvr>
+</p:sld>
+</file>
+
+<file path=ppt/slides/slide21.xml><?xml version="1.0" encoding="utf-8"?>
+<p:sld xmlns:a="http://schemas.openxmlformats.org/drawingml/2006/main" xmlns:r="http://schemas.openxmlformats.org/officeDocument/2006/relationships" xmlns:p="http://schemas.openxmlformats.org/presentationml/2006/main">
+  <p:cSld>
+    <p:spTree>
+      <p:nvGrpSpPr>
+        <p:cNvPr id="1" name="Shape 122"/>
+        <p:cNvGrpSpPr/>
+        <p:nvPr/>
+      </p:nvGrpSpPr>
+      <p:grpSpPr>
+        <a:xfrm>
+          <a:off x="0" y="0"/>
+          <a:ext cx="0" cy="0"/>
+          <a:chOff x="0" y="0"/>
+          <a:chExt cx="0" cy="0"/>
+        </a:xfrm>
+      </p:grpSpPr>
+      <p:pic>
+        <p:nvPicPr>
+          <p:cNvPr id="123" name="Google Shape;123;p24"/>
+          <p:cNvPicPr preferRelativeResize="0"/>
+          <p:nvPr/>
+        </p:nvPicPr>
+        <p:blipFill rotWithShape="1">
+          <a:blip r:embed="rId3">
+            <a:alphaModFix/>
+          </a:blip>
+          <a:srcRect t="5033" r="1312"/>
+          <a:stretch/>
+        </p:blipFill>
+        <p:spPr>
+          <a:xfrm>
+            <a:off x="1896163" y="132413"/>
+            <a:ext cx="5351674" cy="4878675"/>
+          </a:xfrm>
+          <a:prstGeom prst="rect">
+            <a:avLst/>
+          </a:prstGeom>
+          <a:noFill/>
+          <a:ln>
+            <a:noFill/>
+          </a:ln>
+        </p:spPr>
+      </p:pic>
+    </p:spTree>
+  </p:cSld>
+  <p:clrMapOvr>
+    <a:masterClrMapping/>
+  </p:clrMapOvr>
+</p:sld>
+</file>
+
+<file path=ppt/slides/slide22.xml><?xml version="1.0" encoding="utf-8"?>
+<p:sld xmlns:a="http://schemas.openxmlformats.org/drawingml/2006/main" xmlns:r="http://schemas.openxmlformats.org/officeDocument/2006/relationships" xmlns:p="http://schemas.openxmlformats.org/presentationml/2006/main">
+  <p:cSld>
+    <p:spTree>
+      <p:nvGrpSpPr>
+        <p:cNvPr id="1" name="Shape 127"/>
+        <p:cNvGrpSpPr/>
+        <p:nvPr/>
+      </p:nvGrpSpPr>
+      <p:grpSpPr>
+        <a:xfrm>
+          <a:off x="0" y="0"/>
+          <a:ext cx="0" cy="0"/>
+          <a:chOff x="0" y="0"/>
+          <a:chExt cx="0" cy="0"/>
+        </a:xfrm>
+      </p:grpSpPr>
+      <p:pic>
+        <p:nvPicPr>
+          <p:cNvPr id="128" name="Google Shape;128;p25"/>
+          <p:cNvPicPr preferRelativeResize="0"/>
+          <p:nvPr/>
+        </p:nvPicPr>
+        <p:blipFill rotWithShape="1">
+          <a:blip r:embed="rId3">
+            <a:alphaModFix/>
+          </a:blip>
+          <a:srcRect t="5303" r="1312"/>
+          <a:stretch/>
+        </p:blipFill>
+        <p:spPr>
+          <a:xfrm>
+            <a:off x="1890863" y="134525"/>
+            <a:ext cx="5362275" cy="4874450"/>
+          </a:xfrm>
+          <a:prstGeom prst="rect">
+            <a:avLst/>
+          </a:prstGeom>
+          <a:noFill/>
+          <a:ln>
+            <a:noFill/>
+          </a:ln>
+        </p:spPr>
+      </p:pic>
+    </p:spTree>
+  </p:cSld>
+  <p:clrMapOvr>
+    <a:masterClrMapping/>
+  </p:clrMapOvr>
+</p:sld>
+</file>
+
+<file path=ppt/slides/slide23.xml><?xml version="1.0" encoding="utf-8"?>
+<p:sld xmlns:a="http://schemas.openxmlformats.org/drawingml/2006/main" xmlns:r="http://schemas.openxmlformats.org/officeDocument/2006/relationships" xmlns:p="http://schemas.openxmlformats.org/presentationml/2006/main">
+  <p:cSld>
+    <p:spTree>
+      <p:nvGrpSpPr>
         <p:cNvPr id="1" name="Shape 132"/>
         <p:cNvGrpSpPr/>
         <p:nvPr/>
@@ -10460,355 +11111,6 @@
           </a:ln>
         </p:spPr>
       </p:pic>
-    </p:spTree>
-  </p:cSld>
-  <p:clrMapOvr>
-    <a:masterClrMapping/>
-  </p:clrMapOvr>
-</p:sld>
-</file>
-
-<file path=ppt/slides/slide21.xml><?xml version="1.0" encoding="utf-8"?>
-<p:sld xmlns:a="http://schemas.openxmlformats.org/drawingml/2006/main" xmlns:r="http://schemas.openxmlformats.org/officeDocument/2006/relationships" xmlns:p="http://schemas.openxmlformats.org/presentationml/2006/main">
-  <p:cSld>
-    <p:spTree>
-      <p:nvGrpSpPr>
-        <p:cNvPr id="1" name="Shape 142"/>
-        <p:cNvGrpSpPr/>
-        <p:nvPr/>
-      </p:nvGrpSpPr>
-      <p:grpSpPr>
-        <a:xfrm>
-          <a:off x="0" y="0"/>
-          <a:ext cx="0" cy="0"/>
-          <a:chOff x="0" y="0"/>
-          <a:chExt cx="0" cy="0"/>
-        </a:xfrm>
-      </p:grpSpPr>
-      <p:pic>
-        <p:nvPicPr>
-          <p:cNvPr id="143" name="Google Shape;143;p28"/>
-          <p:cNvPicPr preferRelativeResize="0"/>
-          <p:nvPr/>
-        </p:nvPicPr>
-        <p:blipFill>
-          <a:blip r:embed="rId3">
-            <a:alphaModFix/>
-          </a:blip>
-          <a:stretch>
-            <a:fillRect/>
-          </a:stretch>
-        </p:blipFill>
-        <p:spPr>
-          <a:xfrm>
-            <a:off x="1338574" y="148450"/>
-            <a:ext cx="7662074" cy="4693276"/>
-          </a:xfrm>
-          <a:prstGeom prst="rect">
-            <a:avLst/>
-          </a:prstGeom>
-          <a:noFill/>
-          <a:ln>
-            <a:noFill/>
-          </a:ln>
-        </p:spPr>
-      </p:pic>
-      <p:sp>
-        <p:nvSpPr>
-          <p:cNvPr id="144" name="Google Shape;144;p28"/>
-          <p:cNvSpPr txBox="1">
-            <a:spLocks noGrp="1"/>
-          </p:cNvSpPr>
-          <p:nvPr>
-            <p:ph type="body" idx="1"/>
-          </p:nvPr>
-        </p:nvSpPr>
-        <p:spPr>
-          <a:xfrm>
-            <a:off x="195050" y="465750"/>
-            <a:ext cx="907800" cy="1464300"/>
-          </a:xfrm>
-          <a:prstGeom prst="rect">
-            <a:avLst/>
-          </a:prstGeom>
-        </p:spPr>
-        <p:txBody>
-          <a:bodyPr spcFirstLastPara="1" wrap="square" lIns="91425" tIns="91425" rIns="91425" bIns="91425" anchor="ctr" anchorCtr="0">
-            <a:noAutofit/>
-          </a:bodyPr>
-          <a:lstStyle/>
-          <a:p>
-            <a:pPr marL="0" lvl="0" indent="0" algn="ctr" rtl="0">
-              <a:spcBef>
-                <a:spcPts val="0"/>
-              </a:spcBef>
-              <a:spcAft>
-                <a:spcPts val="0"/>
-              </a:spcAft>
-              <a:buNone/>
-            </a:pPr>
-            <a:r>
-              <a:rPr lang="en"/>
-              <a:t>URL builder</a:t>
-            </a:r>
-            <a:endParaRPr/>
-          </a:p>
-          <a:p>
-            <a:pPr marL="0" lvl="0" indent="0" algn="l" rtl="0">
-              <a:spcBef>
-                <a:spcPts val="0"/>
-              </a:spcBef>
-              <a:spcAft>
-                <a:spcPts val="0"/>
-              </a:spcAft>
-              <a:buNone/>
-            </a:pPr>
-            <a:endParaRPr/>
-          </a:p>
-          <a:p>
-            <a:pPr marL="0" lvl="0" indent="0" algn="l" rtl="0">
-              <a:spcBef>
-                <a:spcPts val="0"/>
-              </a:spcBef>
-              <a:spcAft>
-                <a:spcPts val="0"/>
-              </a:spcAft>
-              <a:buNone/>
-            </a:pPr>
-            <a:endParaRPr/>
-          </a:p>
-        </p:txBody>
-      </p:sp>
-    </p:spTree>
-  </p:cSld>
-  <p:clrMapOvr>
-    <a:masterClrMapping/>
-  </p:clrMapOvr>
-</p:sld>
-</file>
-
-<file path=ppt/slides/slide22.xml><?xml version="1.0" encoding="utf-8"?>
-<p:sld xmlns:a="http://schemas.openxmlformats.org/drawingml/2006/main" xmlns:r="http://schemas.openxmlformats.org/officeDocument/2006/relationships" xmlns:p="http://schemas.openxmlformats.org/presentationml/2006/main">
-  <p:cSld>
-    <p:spTree>
-      <p:nvGrpSpPr>
-        <p:cNvPr id="1" name="Shape 148"/>
-        <p:cNvGrpSpPr/>
-        <p:nvPr/>
-      </p:nvGrpSpPr>
-      <p:grpSpPr>
-        <a:xfrm>
-          <a:off x="0" y="0"/>
-          <a:ext cx="0" cy="0"/>
-          <a:chOff x="0" y="0"/>
-          <a:chExt cx="0" cy="0"/>
-        </a:xfrm>
-      </p:grpSpPr>
-      <p:pic>
-        <p:nvPicPr>
-          <p:cNvPr id="149" name="Google Shape;149;p29"/>
-          <p:cNvPicPr preferRelativeResize="0"/>
-          <p:nvPr/>
-        </p:nvPicPr>
-        <p:blipFill>
-          <a:blip r:embed="rId3">
-            <a:alphaModFix/>
-          </a:blip>
-          <a:stretch>
-            <a:fillRect/>
-          </a:stretch>
-        </p:blipFill>
-        <p:spPr>
-          <a:xfrm>
-            <a:off x="2392900" y="137875"/>
-            <a:ext cx="6644100" cy="4862949"/>
-          </a:xfrm>
-          <a:prstGeom prst="rect">
-            <a:avLst/>
-          </a:prstGeom>
-          <a:noFill/>
-          <a:ln>
-            <a:noFill/>
-          </a:ln>
-        </p:spPr>
-      </p:pic>
-      <p:sp>
-        <p:nvSpPr>
-          <p:cNvPr id="150" name="Google Shape;150;p29"/>
-          <p:cNvSpPr txBox="1">
-            <a:spLocks noGrp="1"/>
-          </p:cNvSpPr>
-          <p:nvPr>
-            <p:ph type="body" idx="1"/>
-          </p:nvPr>
-        </p:nvSpPr>
-        <p:spPr>
-          <a:xfrm>
-            <a:off x="248075" y="455150"/>
-            <a:ext cx="2106300" cy="1422000"/>
-          </a:xfrm>
-          <a:prstGeom prst="rect">
-            <a:avLst/>
-          </a:prstGeom>
-        </p:spPr>
-        <p:txBody>
-          <a:bodyPr spcFirstLastPara="1" wrap="square" lIns="91425" tIns="91425" rIns="91425" bIns="91425" anchor="ctr" anchorCtr="0">
-            <a:noAutofit/>
-          </a:bodyPr>
-          <a:lstStyle/>
-          <a:p>
-            <a:pPr marL="0" lvl="0" indent="0" algn="l" rtl="0">
-              <a:spcBef>
-                <a:spcPts val="0"/>
-              </a:spcBef>
-              <a:spcAft>
-                <a:spcPts val="0"/>
-              </a:spcAft>
-              <a:buNone/>
-            </a:pPr>
-            <a:r>
-              <a:rPr lang="en"/>
-              <a:t>Page Data</a:t>
-            </a:r>
-            <a:endParaRPr/>
-          </a:p>
-          <a:p>
-            <a:pPr marL="0" lvl="0" indent="0" algn="l" rtl="0">
-              <a:spcBef>
-                <a:spcPts val="0"/>
-              </a:spcBef>
-              <a:spcAft>
-                <a:spcPts val="0"/>
-              </a:spcAft>
-              <a:buNone/>
-            </a:pPr>
-            <a:endParaRPr/>
-          </a:p>
-        </p:txBody>
-      </p:sp>
-    </p:spTree>
-  </p:cSld>
-  <p:clrMapOvr>
-    <a:masterClrMapping/>
-  </p:clrMapOvr>
-</p:sld>
-</file>
-
-<file path=ppt/slides/slide23.xml><?xml version="1.0" encoding="utf-8"?>
-<p:sld xmlns:a="http://schemas.openxmlformats.org/drawingml/2006/main" xmlns:r="http://schemas.openxmlformats.org/officeDocument/2006/relationships" xmlns:p="http://schemas.openxmlformats.org/presentationml/2006/main">
-  <p:cSld>
-    <p:spTree>
-      <p:nvGrpSpPr>
-        <p:cNvPr id="1" name="Shape 154"/>
-        <p:cNvGrpSpPr/>
-        <p:nvPr/>
-      </p:nvGrpSpPr>
-      <p:grpSpPr>
-        <a:xfrm>
-          <a:off x="0" y="0"/>
-          <a:ext cx="0" cy="0"/>
-          <a:chOff x="0" y="0"/>
-          <a:chExt cx="0" cy="0"/>
-        </a:xfrm>
-      </p:grpSpPr>
-      <p:pic>
-        <p:nvPicPr>
-          <p:cNvPr id="155" name="Google Shape;155;p30"/>
-          <p:cNvPicPr preferRelativeResize="0"/>
-          <p:nvPr/>
-        </p:nvPicPr>
-        <p:blipFill>
-          <a:blip r:embed="rId3">
-            <a:alphaModFix/>
-          </a:blip>
-          <a:stretch>
-            <a:fillRect/>
-          </a:stretch>
-        </p:blipFill>
-        <p:spPr>
-          <a:xfrm>
-            <a:off x="1419973" y="225112"/>
-            <a:ext cx="7553551" cy="4693275"/>
-          </a:xfrm>
-          <a:prstGeom prst="rect">
-            <a:avLst/>
-          </a:prstGeom>
-          <a:noFill/>
-          <a:ln>
-            <a:noFill/>
-          </a:ln>
-        </p:spPr>
-      </p:pic>
-      <p:sp>
-        <p:nvSpPr>
-          <p:cNvPr id="156" name="Google Shape;156;p30"/>
-          <p:cNvSpPr txBox="1">
-            <a:spLocks noGrp="1"/>
-          </p:cNvSpPr>
-          <p:nvPr>
-            <p:ph type="body" idx="1"/>
-          </p:nvPr>
-        </p:nvSpPr>
-        <p:spPr>
-          <a:xfrm>
-            <a:off x="248075" y="455150"/>
-            <a:ext cx="1056300" cy="1443300"/>
-          </a:xfrm>
-          <a:prstGeom prst="rect">
-            <a:avLst/>
-          </a:prstGeom>
-        </p:spPr>
-        <p:txBody>
-          <a:bodyPr spcFirstLastPara="1" wrap="square" lIns="91425" tIns="91425" rIns="91425" bIns="91425" anchor="ctr" anchorCtr="0">
-            <a:noAutofit/>
-          </a:bodyPr>
-          <a:lstStyle/>
-          <a:p>
-            <a:pPr marL="0" lvl="0" indent="0" algn="ctr" rtl="0">
-              <a:spcBef>
-                <a:spcPts val="0"/>
-              </a:spcBef>
-              <a:spcAft>
-                <a:spcPts val="0"/>
-              </a:spcAft>
-              <a:buNone/>
-            </a:pPr>
-            <a:r>
-              <a:rPr lang="en"/>
-              <a:t>Details of </a:t>
-            </a:r>
-            <a:endParaRPr/>
-          </a:p>
-          <a:p>
-            <a:pPr marL="0" lvl="0" indent="0" algn="ctr" rtl="0">
-              <a:spcBef>
-                <a:spcPts val="0"/>
-              </a:spcBef>
-              <a:spcAft>
-                <a:spcPts val="0"/>
-              </a:spcAft>
-              <a:buNone/>
-            </a:pPr>
-            <a:r>
-              <a:rPr lang="en"/>
-              <a:t>‘List Card’</a:t>
-            </a:r>
-            <a:endParaRPr/>
-          </a:p>
-          <a:p>
-            <a:pPr marL="0" lvl="0" indent="0" algn="l" rtl="0">
-              <a:spcBef>
-                <a:spcPts val="0"/>
-              </a:spcBef>
-              <a:spcAft>
-                <a:spcPts val="0"/>
-              </a:spcAft>
-              <a:buNone/>
-            </a:pPr>
-            <a:endParaRPr/>
-          </a:p>
-        </p:txBody>
-      </p:sp>
     </p:spTree>
   </p:cSld>
   <p:clrMapOvr>
@@ -12092,7 +12394,7 @@
   <p:cSld>
     <p:spTree>
       <p:nvGrpSpPr>
-        <p:cNvPr id="1" name="Shape 76"/>
+        <p:cNvPr id="1" name="Shape 142"/>
         <p:cNvGrpSpPr/>
         <p:nvPr/>
       </p:nvGrpSpPr>
@@ -12104,66 +12406,48 @@
           <a:chExt cx="0" cy="0"/>
         </a:xfrm>
       </p:grpSpPr>
+      <p:pic>
+        <p:nvPicPr>
+          <p:cNvPr id="143" name="Google Shape;143;p28"/>
+          <p:cNvPicPr preferRelativeResize="0"/>
+          <p:nvPr/>
+        </p:nvPicPr>
+        <p:blipFill>
+          <a:blip r:embed="rId3">
+            <a:alphaModFix/>
+          </a:blip>
+          <a:stretch>
+            <a:fillRect/>
+          </a:stretch>
+        </p:blipFill>
+        <p:spPr>
+          <a:xfrm>
+            <a:off x="1338574" y="148450"/>
+            <a:ext cx="7662074" cy="4693276"/>
+          </a:xfrm>
+          <a:prstGeom prst="rect">
+            <a:avLst/>
+          </a:prstGeom>
+          <a:noFill/>
+          <a:ln>
+            <a:noFill/>
+          </a:ln>
+        </p:spPr>
+      </p:pic>
       <p:sp>
         <p:nvSpPr>
-          <p:cNvPr id="77" name="Google Shape;77;p16"/>
+          <p:cNvPr id="144" name="Google Shape;144;p28"/>
           <p:cNvSpPr txBox="1">
             <a:spLocks noGrp="1"/>
           </p:cNvSpPr>
           <p:nvPr>
-            <p:ph type="title"/>
+            <p:ph type="body" idx="1"/>
           </p:nvPr>
         </p:nvSpPr>
         <p:spPr>
           <a:xfrm>
-            <a:off x="265500" y="1382350"/>
-            <a:ext cx="4045200" cy="1333200"/>
-          </a:xfrm>
-          <a:prstGeom prst="rect">
-            <a:avLst/>
-          </a:prstGeom>
-        </p:spPr>
-        <p:txBody>
-          <a:bodyPr spcFirstLastPara="1" wrap="square" lIns="91425" tIns="91425" rIns="91425" bIns="91425" anchor="b" anchorCtr="0">
-            <a:noAutofit/>
-          </a:bodyPr>
-          <a:lstStyle/>
-          <a:p>
-            <a:pPr marL="0" lvl="0" indent="0" algn="ctr" rtl="0">
-              <a:spcBef>
-                <a:spcPts val="0"/>
-              </a:spcBef>
-              <a:spcAft>
-                <a:spcPts val="0"/>
-              </a:spcAft>
-              <a:buNone/>
-            </a:pPr>
-            <a:r>
-              <a:rPr lang="en" dirty="0"/>
-              <a:t>Data</a:t>
-            </a:r>
-            <a:r>
-              <a:rPr lang="en-US" dirty="0"/>
-              <a:t>base</a:t>
-            </a:r>
-            <a:endParaRPr dirty="0"/>
-          </a:p>
-        </p:txBody>
-      </p:sp>
-      <p:sp>
-        <p:nvSpPr>
-          <p:cNvPr id="79" name="Google Shape;79;p16"/>
-          <p:cNvSpPr txBox="1">
-            <a:spLocks noGrp="1"/>
-          </p:cNvSpPr>
-          <p:nvPr>
-            <p:ph type="body" idx="2"/>
-          </p:nvPr>
-        </p:nvSpPr>
-        <p:spPr>
-          <a:xfrm>
-            <a:off x="4939500" y="724200"/>
-            <a:ext cx="3837000" cy="3695100"/>
+            <a:off x="195050" y="465750"/>
+            <a:ext cx="907800" cy="1464300"/>
           </a:xfrm>
           <a:prstGeom prst="rect">
             <a:avLst/>
@@ -12175,87 +12459,48 @@
           </a:bodyPr>
           <a:lstStyle/>
           <a:p>
+            <a:pPr marL="0" lvl="0" indent="0" algn="ctr" rtl="0">
+              <a:spcBef>
+                <a:spcPts val="0"/>
+              </a:spcBef>
+              <a:spcAft>
+                <a:spcPts val="0"/>
+              </a:spcAft>
+              <a:buNone/>
+            </a:pPr>
             <a:r>
-              <a:rPr lang="en-US" sz="2000" dirty="0" err="1">
-                <a:latin typeface="+mn-lt"/>
-              </a:rPr>
-              <a:t>PgAdmin</a:t>
+              <a:rPr lang="en"/>
+              <a:t>URL builder</a:t>
             </a:r>
-            <a:r>
-              <a:rPr lang="en-US" sz="2000" dirty="0">
-                <a:latin typeface="+mn-lt"/>
-              </a:rPr>
-              <a:t> database</a:t>
-            </a:r>
-          </a:p>
-          <a:p>
-            <a:pPr lvl="1"/>
-            <a:r>
-              <a:rPr lang="en-US" sz="2000" dirty="0">
-                <a:latin typeface="+mn-lt"/>
-              </a:rPr>
-              <a:t>Table 1 – Housing Data</a:t>
-            </a:r>
-          </a:p>
-          <a:p>
-            <a:pPr lvl="1"/>
-            <a:r>
-              <a:rPr lang="en-US" sz="2000" dirty="0">
-                <a:latin typeface="+mn-lt"/>
-              </a:rPr>
-              <a:t>Table 2 – Transition table </a:t>
-            </a:r>
-            <a:r>
-              <a:rPr lang="en-US" sz="2000" dirty="0" err="1">
-                <a:latin typeface="+mn-lt"/>
-              </a:rPr>
-              <a:t>zipcode</a:t>
-            </a:r>
-            <a:r>
-              <a:rPr lang="en-US" sz="2000" dirty="0">
-                <a:latin typeface="+mn-lt"/>
-              </a:rPr>
-              <a:t> to </a:t>
-            </a:r>
-            <a:r>
-              <a:rPr lang="en-US" sz="2000" dirty="0" err="1">
-                <a:latin typeface="+mn-lt"/>
-              </a:rPr>
-              <a:t>boro</a:t>
-            </a:r>
-            <a:endParaRPr lang="en-US" sz="2000" dirty="0">
-              <a:latin typeface="+mn-lt"/>
-            </a:endParaRPr>
-          </a:p>
-          <a:p>
-            <a:pPr lvl="1"/>
-            <a:r>
-              <a:rPr lang="en-US" sz="2000" dirty="0">
-                <a:latin typeface="+mn-lt"/>
-              </a:rPr>
-              <a:t>Table 3 - Income</a:t>
-            </a:r>
-          </a:p>
-          <a:p>
-            <a:pPr lvl="1"/>
-            <a:r>
-              <a:rPr lang="en-US" sz="2000" dirty="0">
-                <a:latin typeface="+mn-lt"/>
-              </a:rPr>
-              <a:t>Table 4 - Unemployment</a:t>
-            </a:r>
-            <a:endParaRPr sz="2000" dirty="0">
-              <a:latin typeface="+mn-lt"/>
-            </a:endParaRPr>
+            <a:endParaRPr/>
+          </a:p>
+          <a:p>
+            <a:pPr marL="0" lvl="0" indent="0" algn="l" rtl="0">
+              <a:spcBef>
+                <a:spcPts val="0"/>
+              </a:spcBef>
+              <a:spcAft>
+                <a:spcPts val="0"/>
+              </a:spcAft>
+              <a:buNone/>
+            </a:pPr>
+            <a:endParaRPr/>
+          </a:p>
+          <a:p>
+            <a:pPr marL="0" lvl="0" indent="0" algn="l" rtl="0">
+              <a:spcBef>
+                <a:spcPts val="0"/>
+              </a:spcBef>
+              <a:spcAft>
+                <a:spcPts val="0"/>
+              </a:spcAft>
+              <a:buNone/>
+            </a:pPr>
+            <a:endParaRPr/>
           </a:p>
         </p:txBody>
       </p:sp>
     </p:spTree>
-    <p:extLst>
-      <p:ext uri="{BB962C8B-B14F-4D97-AF65-F5344CB8AC3E}">
-        <p14:creationId xmlns:p14="http://schemas.microsoft.com/office/powerpoint/2010/main" val="2496325506"/>
-      </p:ext>
-    </p:extLst>
   </p:cSld>
   <p:clrMapOvr>
     <a:masterClrMapping/>
@@ -12268,7 +12513,7 @@
   <p:cSld>
     <p:spTree>
       <p:nvGrpSpPr>
-        <p:cNvPr id="1" name="Shape 69"/>
+        <p:cNvPr id="1" name="Shape 148"/>
         <p:cNvGrpSpPr/>
         <p:nvPr/>
       </p:nvGrpSpPr>
@@ -12280,79 +12525,52 @@
           <a:chExt cx="0" cy="0"/>
         </a:xfrm>
       </p:grpSpPr>
+      <p:pic>
+        <p:nvPicPr>
+          <p:cNvPr id="149" name="Google Shape;149;p29"/>
+          <p:cNvPicPr preferRelativeResize="0"/>
+          <p:nvPr/>
+        </p:nvPicPr>
+        <p:blipFill>
+          <a:blip r:embed="rId3">
+            <a:alphaModFix/>
+          </a:blip>
+          <a:stretch>
+            <a:fillRect/>
+          </a:stretch>
+        </p:blipFill>
+        <p:spPr>
+          <a:xfrm>
+            <a:off x="2392900" y="137875"/>
+            <a:ext cx="6644100" cy="4862949"/>
+          </a:xfrm>
+          <a:prstGeom prst="rect">
+            <a:avLst/>
+          </a:prstGeom>
+          <a:noFill/>
+          <a:ln>
+            <a:noFill/>
+          </a:ln>
+        </p:spPr>
+      </p:pic>
       <p:sp>
         <p:nvSpPr>
-          <p:cNvPr id="70" name="Google Shape;70;p15"/>
+          <p:cNvPr id="150" name="Google Shape;150;p29"/>
           <p:cNvSpPr txBox="1">
             <a:spLocks noGrp="1"/>
           </p:cNvSpPr>
           <p:nvPr>
-            <p:ph type="title"/>
+            <p:ph type="body" idx="1"/>
           </p:nvPr>
         </p:nvSpPr>
         <p:spPr>
           <a:xfrm>
-            <a:off x="311839" y="1319916"/>
-            <a:ext cx="4045200" cy="1534602"/>
+            <a:off x="248075" y="455150"/>
+            <a:ext cx="2106300" cy="1422000"/>
           </a:xfrm>
           <a:prstGeom prst="rect">
             <a:avLst/>
           </a:prstGeom>
-        </p:spPr>
-        <p:txBody>
-          <a:bodyPr spcFirstLastPara="1" wrap="square" lIns="91425" tIns="91425" rIns="91425" bIns="91425" anchor="b" anchorCtr="0">
-            <a:noAutofit/>
-          </a:bodyPr>
-          <a:lstStyle/>
-          <a:p>
-            <a:pPr marL="0" lvl="0" indent="0" rtl="0">
-              <a:spcBef>
-                <a:spcPts val="0"/>
-              </a:spcBef>
-              <a:spcAft>
-                <a:spcPts val="0"/>
-              </a:spcAft>
-              <a:buNone/>
-            </a:pPr>
-            <a:r>
-              <a:rPr lang="en-US" sz="5400" dirty="0">
-                <a:latin typeface="+mn-lt"/>
-              </a:rPr>
-              <a:t>ML MODEL</a:t>
-            </a:r>
-            <a:endParaRPr sz="5400" dirty="0">
-              <a:latin typeface="+mn-lt"/>
-            </a:endParaRPr>
-          </a:p>
-        </p:txBody>
-      </p:sp>
-      <p:sp>
-        <p:nvSpPr>
-          <p:cNvPr id="71" name="Google Shape;71;p15"/>
-          <p:cNvSpPr txBox="1">
-            <a:spLocks noGrp="1"/>
-          </p:cNvSpPr>
-          <p:nvPr>
-            <p:ph type="body" idx="2"/>
-          </p:nvPr>
-        </p:nvSpPr>
-        <p:spPr>
-          <a:xfrm>
-            <a:off x="5233700" y="724200"/>
-            <a:ext cx="3837000" cy="3695100"/>
-          </a:xfrm>
-          <a:prstGeom prst="rect">
-            <a:avLst/>
-          </a:prstGeom>
-          <a:ln w="9525" cap="flat" cmpd="sng">
-            <a:solidFill>
-              <a:schemeClr val="dk1"/>
-            </a:solidFill>
-            <a:prstDash val="solid"/>
-            <a:round/>
-            <a:headEnd type="none" w="sm" len="sm"/>
-            <a:tailEnd type="none" w="sm" len="sm"/>
-          </a:ln>
         </p:spPr>
         <p:txBody>
           <a:bodyPr spcFirstLastPara="1" wrap="square" lIns="91425" tIns="91425" rIns="91425" bIns="91425" anchor="ctr" anchorCtr="0">
@@ -12360,123 +12578,36 @@
           </a:bodyPr>
           <a:lstStyle/>
           <a:p>
-            <a:pPr marL="457200" lvl="0" indent="0" algn="l" rtl="0">
-              <a:spcBef>
-                <a:spcPts val="0"/>
-              </a:spcBef>
-              <a:spcAft>
-                <a:spcPts val="0"/>
-              </a:spcAft>
-              <a:buNone/>
-            </a:pPr>
-            <a:endParaRPr sz="2200" dirty="0">
-              <a:solidFill>
-                <a:srgbClr val="F3F3F3"/>
-              </a:solidFill>
-              <a:latin typeface="+mj-lt"/>
-            </a:endParaRPr>
-          </a:p>
-          <a:p>
-            <a:pPr marL="457200" lvl="0" indent="-342900" algn="l" rtl="0">
-              <a:spcBef>
-                <a:spcPts val="1600"/>
-              </a:spcBef>
-              <a:spcAft>
-                <a:spcPts val="0"/>
-              </a:spcAft>
-              <a:buClr>
-                <a:srgbClr val="F3F3F3"/>
-              </a:buClr>
-              <a:buSzPts val="1800"/>
-              <a:buChar char="●"/>
+            <a:pPr marL="0" lvl="0" indent="0" algn="l" rtl="0">
+              <a:spcBef>
+                <a:spcPts val="0"/>
+              </a:spcBef>
+              <a:spcAft>
+                <a:spcPts val="0"/>
+              </a:spcAft>
+              <a:buNone/>
             </a:pPr>
             <a:r>
-              <a:rPr lang="en-US" sz="3200" dirty="0">
-                <a:solidFill>
-                  <a:srgbClr val="F3F3F3"/>
-                </a:solidFill>
-                <a:latin typeface="+mn-lt"/>
-              </a:rPr>
-              <a:t>Data Pre- Processing</a:t>
+              <a:rPr lang="en"/>
+              <a:t>Page Data</a:t>
             </a:r>
-          </a:p>
-          <a:p>
-            <a:pPr marL="457200" lvl="0" indent="-342900" algn="l" rtl="0">
-              <a:spcBef>
-                <a:spcPts val="1600"/>
-              </a:spcBef>
-              <a:spcAft>
-                <a:spcPts val="0"/>
-              </a:spcAft>
-              <a:buClr>
-                <a:srgbClr val="F3F3F3"/>
-              </a:buClr>
-              <a:buSzPts val="1800"/>
-              <a:buChar char="●"/>
+            <a:endParaRPr/>
+          </a:p>
+          <a:p>
+            <a:pPr marL="0" lvl="0" indent="0" algn="l" rtl="0">
+              <a:spcBef>
+                <a:spcPts val="0"/>
+              </a:spcBef>
+              <a:spcAft>
+                <a:spcPts val="0"/>
+              </a:spcAft>
+              <a:buNone/>
             </a:pPr>
-            <a:r>
-              <a:rPr lang="en-US" sz="3200" dirty="0">
-                <a:solidFill>
-                  <a:srgbClr val="F3F3F3"/>
-                </a:solidFill>
-                <a:latin typeface="+mn-lt"/>
-              </a:rPr>
-              <a:t>Split data into training and testing</a:t>
-            </a:r>
-          </a:p>
-          <a:p>
-            <a:pPr marL="457200" lvl="0" indent="-342900" algn="l" rtl="0">
-              <a:spcBef>
-                <a:spcPts val="1600"/>
-              </a:spcBef>
-              <a:spcAft>
-                <a:spcPts val="0"/>
-              </a:spcAft>
-              <a:buClr>
-                <a:srgbClr val="F3F3F3"/>
-              </a:buClr>
-              <a:buSzPts val="1800"/>
-              <a:buChar char="●"/>
-            </a:pPr>
-            <a:r>
-              <a:rPr lang="en-US" sz="3200" dirty="0">
-                <a:solidFill>
-                  <a:srgbClr val="F3F3F3"/>
-                </a:solidFill>
-                <a:latin typeface="+mn-lt"/>
-              </a:rPr>
-              <a:t>Model Choice</a:t>
-            </a:r>
-          </a:p>
-          <a:p>
-            <a:pPr marL="457200" lvl="0" indent="-342900" algn="l" rtl="0">
-              <a:spcBef>
-                <a:spcPts val="1600"/>
-              </a:spcBef>
-              <a:spcAft>
-                <a:spcPts val="0"/>
-              </a:spcAft>
-              <a:buClr>
-                <a:srgbClr val="F3F3F3"/>
-              </a:buClr>
-              <a:buSzPts val="1800"/>
-              <a:buChar char="●"/>
-            </a:pPr>
-            <a:endParaRPr sz="3600" dirty="0">
-              <a:solidFill>
-                <a:srgbClr val="F3F3F3"/>
-              </a:solidFill>
-              <a:latin typeface="+mn-lt"/>
-            </a:endParaRPr>
+            <a:endParaRPr/>
           </a:p>
         </p:txBody>
       </p:sp>
     </p:spTree>
-    <p:extLst>
-      <p:ext uri="{BB962C8B-B14F-4D97-AF65-F5344CB8AC3E}">
-        <p14:creationId xmlns:p14="http://schemas.microsoft.com/office/powerpoint/2010/main" val="1542820501"/>
-      </p:ext>
-    </p:extLst>
   </p:cSld>
   <p:clrMapOvr>
     <a:masterClrMapping/>
@@ -12489,7 +12620,7 @@
   <p:cSld>
     <p:spTree>
       <p:nvGrpSpPr>
-        <p:cNvPr id="1" name="Shape 76"/>
+        <p:cNvPr id="1" name="Shape 154"/>
         <p:cNvGrpSpPr/>
         <p:nvPr/>
       </p:nvGrpSpPr>
@@ -12501,70 +12632,48 @@
           <a:chExt cx="0" cy="0"/>
         </a:xfrm>
       </p:grpSpPr>
+      <p:pic>
+        <p:nvPicPr>
+          <p:cNvPr id="155" name="Google Shape;155;p30"/>
+          <p:cNvPicPr preferRelativeResize="0"/>
+          <p:nvPr/>
+        </p:nvPicPr>
+        <p:blipFill>
+          <a:blip r:embed="rId3">
+            <a:alphaModFix/>
+          </a:blip>
+          <a:stretch>
+            <a:fillRect/>
+          </a:stretch>
+        </p:blipFill>
+        <p:spPr>
+          <a:xfrm>
+            <a:off x="1419973" y="225112"/>
+            <a:ext cx="7553551" cy="4693275"/>
+          </a:xfrm>
+          <a:prstGeom prst="rect">
+            <a:avLst/>
+          </a:prstGeom>
+          <a:noFill/>
+          <a:ln>
+            <a:noFill/>
+          </a:ln>
+        </p:spPr>
+      </p:pic>
       <p:sp>
         <p:nvSpPr>
-          <p:cNvPr id="77" name="Google Shape;77;p16"/>
+          <p:cNvPr id="156" name="Google Shape;156;p30"/>
           <p:cNvSpPr txBox="1">
             <a:spLocks noGrp="1"/>
           </p:cNvSpPr>
           <p:nvPr>
-            <p:ph type="title"/>
+            <p:ph type="body" idx="1"/>
           </p:nvPr>
         </p:nvSpPr>
         <p:spPr>
           <a:xfrm>
-            <a:off x="265500" y="1382350"/>
-            <a:ext cx="4045200" cy="1333200"/>
-          </a:xfrm>
-          <a:prstGeom prst="rect">
-            <a:avLst/>
-          </a:prstGeom>
-        </p:spPr>
-        <p:txBody>
-          <a:bodyPr spcFirstLastPara="1" wrap="square" lIns="91425" tIns="91425" rIns="91425" bIns="91425" anchor="b" anchorCtr="0">
-            <a:noAutofit/>
-          </a:bodyPr>
-          <a:lstStyle/>
-          <a:p>
-            <a:pPr marL="0" lvl="0" indent="0" algn="ctr" rtl="0">
-              <a:spcBef>
-                <a:spcPts val="0"/>
-              </a:spcBef>
-              <a:spcAft>
-                <a:spcPts val="0"/>
-              </a:spcAft>
-              <a:buNone/>
-            </a:pPr>
-            <a:r>
-              <a:rPr lang="en" dirty="0"/>
-              <a:t>D</a:t>
-            </a:r>
-            <a:r>
-              <a:rPr lang="en-US" dirty="0" err="1"/>
-              <a:t>ata</a:t>
-            </a:r>
-            <a:r>
-              <a:rPr lang="en-US" dirty="0"/>
-              <a:t> Pre-Processing</a:t>
-            </a:r>
-            <a:endParaRPr dirty="0"/>
-          </a:p>
-        </p:txBody>
-      </p:sp>
-      <p:sp>
-        <p:nvSpPr>
-          <p:cNvPr id="79" name="Google Shape;79;p16"/>
-          <p:cNvSpPr txBox="1">
-            <a:spLocks noGrp="1"/>
-          </p:cNvSpPr>
-          <p:nvPr>
-            <p:ph type="body" idx="2"/>
-          </p:nvPr>
-        </p:nvSpPr>
-        <p:spPr>
-          <a:xfrm>
-            <a:off x="5041500" y="445904"/>
-            <a:ext cx="3837000" cy="3695100"/>
+            <a:off x="248075" y="455150"/>
+            <a:ext cx="1056300" cy="1443300"/>
           </a:xfrm>
           <a:prstGeom prst="rect">
             <a:avLst/>
@@ -12576,111 +12685,52 @@
           </a:bodyPr>
           <a:lstStyle/>
           <a:p>
-            <a:pPr lvl="0">
-              <a:spcBef>
-                <a:spcPts val="1600"/>
-              </a:spcBef>
-              <a:buClr>
-                <a:srgbClr val="F3F3F3"/>
-              </a:buClr>
+            <a:pPr marL="0" lvl="0" indent="0" algn="ctr" rtl="0">
+              <a:spcBef>
+                <a:spcPts val="0"/>
+              </a:spcBef>
+              <a:spcAft>
+                <a:spcPts val="0"/>
+              </a:spcAft>
+              <a:buNone/>
             </a:pPr>
             <a:r>
-              <a:rPr lang="en-US" dirty="0">
-                <a:solidFill>
-                  <a:srgbClr val="F3F3F3"/>
-                </a:solidFill>
-                <a:latin typeface="+mn-lt"/>
-              </a:rPr>
-              <a:t>Data Selection</a:t>
+              <a:rPr lang="en"/>
+              <a:t>Details of </a:t>
             </a:r>
-          </a:p>
-          <a:p>
-            <a:pPr lvl="1">
-              <a:buClr>
-                <a:srgbClr val="F3F3F3"/>
-              </a:buClr>
+            <a:endParaRPr/>
+          </a:p>
+          <a:p>
+            <a:pPr marL="0" lvl="0" indent="0" algn="ctr" rtl="0">
+              <a:spcBef>
+                <a:spcPts val="0"/>
+              </a:spcBef>
+              <a:spcAft>
+                <a:spcPts val="0"/>
+              </a:spcAft>
+              <a:buNone/>
             </a:pPr>
             <a:r>
-              <a:rPr lang="en-US" sz="1800" dirty="0">
-                <a:solidFill>
-                  <a:srgbClr val="F3F3F3"/>
-                </a:solidFill>
-                <a:latin typeface="+mn-lt"/>
-              </a:rPr>
-              <a:t>Zillow scraping, IRS, Unemployment</a:t>
+              <a:rPr lang="en"/>
+              <a:t>‘List Card’</a:t>
             </a:r>
-          </a:p>
-          <a:p>
-            <a:pPr lvl="1">
-              <a:buClr>
-                <a:srgbClr val="F3F3F3"/>
-              </a:buClr>
+            <a:endParaRPr/>
+          </a:p>
+          <a:p>
+            <a:pPr marL="0" lvl="0" indent="0" algn="l" rtl="0">
+              <a:spcBef>
+                <a:spcPts val="0"/>
+              </a:spcBef>
+              <a:spcAft>
+                <a:spcPts val="0"/>
+              </a:spcAft>
+              <a:buNone/>
             </a:pPr>
-            <a:r>
-              <a:rPr lang="en-US" sz="1800" dirty="0">
-                <a:solidFill>
-                  <a:srgbClr val="F3F3F3"/>
-                </a:solidFill>
-                <a:latin typeface="+mn-lt"/>
-              </a:rPr>
-              <a:t>Shortcomings: data missing zip code level</a:t>
-            </a:r>
-          </a:p>
-          <a:p>
-            <a:pPr lvl="1">
-              <a:buClr>
-                <a:srgbClr val="F3F3F3"/>
-              </a:buClr>
-            </a:pPr>
-            <a:r>
-              <a:rPr lang="en-US" sz="1800" dirty="0">
-                <a:solidFill>
-                  <a:srgbClr val="F3F3F3"/>
-                </a:solidFill>
-                <a:latin typeface="+mn-lt"/>
-              </a:rPr>
-              <a:t>Workaround – translated data into zip code by </a:t>
-            </a:r>
-            <a:r>
-              <a:rPr lang="en-US" sz="1800" dirty="0" err="1">
-                <a:solidFill>
-                  <a:srgbClr val="F3F3F3"/>
-                </a:solidFill>
-                <a:latin typeface="+mn-lt"/>
-              </a:rPr>
-              <a:t>boro</a:t>
-            </a:r>
-            <a:endParaRPr lang="en-US" sz="1800" dirty="0">
-              <a:solidFill>
-                <a:srgbClr val="F3F3F3"/>
-              </a:solidFill>
-              <a:latin typeface="+mn-lt"/>
-            </a:endParaRPr>
-          </a:p>
-          <a:p>
-            <a:pPr lvl="1">
-              <a:buClr>
-                <a:srgbClr val="F3F3F3"/>
-              </a:buClr>
-            </a:pPr>
-            <a:r>
-              <a:rPr lang="en-US" sz="1800" dirty="0">
-                <a:solidFill>
-                  <a:srgbClr val="F3F3F3"/>
-                </a:solidFill>
-                <a:latin typeface="+mn-lt"/>
-              </a:rPr>
-              <a:t>Redundancy in data</a:t>
-            </a:r>
+            <a:endParaRPr/>
           </a:p>
         </p:txBody>
       </p:sp>
     </p:spTree>
-    <p:extLst>
-      <p:ext uri="{BB962C8B-B14F-4D97-AF65-F5344CB8AC3E}">
-        <p14:creationId xmlns:p14="http://schemas.microsoft.com/office/powerpoint/2010/main" val="1537835849"/>
-      </p:ext>
-    </p:extLst>
   </p:cSld>
   <p:clrMapOvr>
     <a:masterClrMapping/>
@@ -12741,15 +12791,11 @@
             </a:pPr>
             <a:r>
               <a:rPr lang="en" dirty="0"/>
-              <a:t>D</a:t>
-            </a:r>
-            <a:r>
-              <a:rPr lang="en-US" dirty="0" err="1"/>
-              <a:t>ata</a:t>
+              <a:t>Data</a:t>
             </a:r>
             <a:r>
               <a:rPr lang="en-US" dirty="0"/>
-              <a:t> Pre-Processing</a:t>
+              <a:t>base</a:t>
             </a:r>
             <a:endParaRPr dirty="0"/>
           </a:p>
@@ -12767,7 +12813,7 @@
         </p:nvSpPr>
         <p:spPr>
           <a:xfrm>
-            <a:off x="5041500" y="445904"/>
+            <a:off x="4939500" y="724200"/>
             <a:ext cx="3837000" cy="3695100"/>
           </a:xfrm>
           <a:prstGeom prst="rect">
@@ -12780,110 +12826,85 @@
           </a:bodyPr>
           <a:lstStyle/>
           <a:p>
-            <a:pPr lvl="0">
-              <a:spcBef>
-                <a:spcPts val="1600"/>
-              </a:spcBef>
-              <a:buClr>
-                <a:srgbClr val="F3F3F3"/>
-              </a:buClr>
-            </a:pPr>
             <a:r>
-              <a:rPr lang="en-US" dirty="0">
-                <a:solidFill>
-                  <a:srgbClr val="F3F3F3"/>
-                </a:solidFill>
+              <a:rPr lang="en-US" sz="2000" dirty="0" err="1">
                 <a:latin typeface="+mn-lt"/>
               </a:rPr>
-              <a:t>Data Processing</a:t>
+              <a:t>PgAdmin</a:t>
             </a:r>
-          </a:p>
-          <a:p>
-            <a:pPr lvl="1">
-              <a:buClr>
-                <a:srgbClr val="F3F3F3"/>
-              </a:buClr>
-            </a:pPr>
             <a:r>
-              <a:rPr lang="en-US" sz="1800" dirty="0">
-                <a:solidFill>
-                  <a:srgbClr val="F3F3F3"/>
-                </a:solidFill>
+              <a:rPr lang="en-US" sz="2000" dirty="0">
                 <a:latin typeface="+mn-lt"/>
               </a:rPr>
-              <a:t>Data formatting, cleaning and sampling</a:t>
+              <a:t> database</a:t>
             </a:r>
           </a:p>
           <a:p>
-            <a:pPr lvl="1">
-              <a:buClr>
-                <a:srgbClr val="F3F3F3"/>
-              </a:buClr>
-            </a:pPr>
+            <a:pPr lvl="1"/>
             <a:r>
-              <a:rPr lang="en-US" sz="1800" dirty="0">
-                <a:solidFill>
-                  <a:srgbClr val="F3F3F3"/>
-                </a:solidFill>
+              <a:rPr lang="en-US" sz="2000" dirty="0">
                 <a:latin typeface="+mn-lt"/>
               </a:rPr>
-              <a:t>Dropped null values</a:t>
+              <a:t>Table 1 – Housing Data</a:t>
             </a:r>
           </a:p>
           <a:p>
-            <a:pPr lvl="1">
-              <a:buClr>
-                <a:srgbClr val="F3F3F3"/>
-              </a:buClr>
-            </a:pPr>
+            <a:pPr lvl="1"/>
             <a:r>
-              <a:rPr lang="en-US" sz="1800" dirty="0">
-                <a:solidFill>
-                  <a:srgbClr val="F3F3F3"/>
-                </a:solidFill>
+              <a:rPr lang="en-US" sz="2000" dirty="0">
                 <a:latin typeface="+mn-lt"/>
               </a:rPr>
-              <a:t>Data type conversions</a:t>
+              <a:t>Table 2 – Transition table </a:t>
             </a:r>
-          </a:p>
-          <a:p>
-            <a:pPr lvl="1">
-              <a:buClr>
-                <a:srgbClr val="F3F3F3"/>
-              </a:buClr>
-            </a:pPr>
             <a:r>
-              <a:rPr lang="en-US" sz="1800" dirty="0">
-                <a:solidFill>
-                  <a:srgbClr val="F3F3F3"/>
-                </a:solidFill>
+              <a:rPr lang="en-US" sz="2000" dirty="0" err="1">
                 <a:latin typeface="+mn-lt"/>
               </a:rPr>
-              <a:t>Bucketing data</a:t>
+              <a:t>zipcode</a:t>
             </a:r>
-          </a:p>
-          <a:p>
-            <a:pPr lvl="1">
-              <a:buClr>
-                <a:srgbClr val="F3F3F3"/>
-              </a:buClr>
-            </a:pPr>
             <a:r>
-              <a:rPr lang="en-US" sz="1800" dirty="0">
-                <a:solidFill>
-                  <a:srgbClr val="F3F3F3"/>
-                </a:solidFill>
+              <a:rPr lang="en-US" sz="2000" dirty="0">
                 <a:latin typeface="+mn-lt"/>
               </a:rPr>
-              <a:t>Dropped outliers </a:t>
+              <a:t> to </a:t>
             </a:r>
+            <a:r>
+              <a:rPr lang="en-US" sz="2000" dirty="0" err="1">
+                <a:latin typeface="+mn-lt"/>
+              </a:rPr>
+              <a:t>boro</a:t>
+            </a:r>
+            <a:endParaRPr lang="en-US" sz="2000" dirty="0">
+              <a:latin typeface="+mn-lt"/>
+            </a:endParaRPr>
+          </a:p>
+          <a:p>
+            <a:pPr lvl="1"/>
+            <a:r>
+              <a:rPr lang="en-US" sz="2000" dirty="0">
+                <a:latin typeface="+mn-lt"/>
+              </a:rPr>
+              <a:t>Table 3 - Income</a:t>
+            </a:r>
+          </a:p>
+          <a:p>
+            <a:pPr lvl="1"/>
+            <a:r>
+              <a:rPr lang="en-US" sz="2000" dirty="0">
+                <a:latin typeface="+mn-lt"/>
+              </a:rPr>
+              <a:t>Table 4 - Unemployment</a:t>
+            </a:r>
+            <a:endParaRPr sz="2000" dirty="0">
+              <a:latin typeface="+mn-lt"/>
+            </a:endParaRPr>
           </a:p>
         </p:txBody>
       </p:sp>
     </p:spTree>
     <p:extLst>
       <p:ext uri="{BB962C8B-B14F-4D97-AF65-F5344CB8AC3E}">
-        <p14:creationId xmlns:p14="http://schemas.microsoft.com/office/powerpoint/2010/main" val="2658748149"/>
+        <p14:creationId xmlns:p14="http://schemas.microsoft.com/office/powerpoint/2010/main" val="2496325506"/>
       </p:ext>
     </p:extLst>
   </p:cSld>

</xml_diff>